<commit_message>
Update Financial data analytics Fraud Detection.pptx
</commit_message>
<xml_diff>
--- a/Financial data analytics Fraud Detection.pptx
+++ b/Financial data analytics Fraud Detection.pptx
@@ -1,71 +1,42 @@
 
 <file path=ppt/presentation.xml><?xml version="1.0" encoding="utf-8"?>
-<p:presentation xmlns:a="http://schemas.openxmlformats.org/drawingml/2006/main" xmlns:r="http://schemas.openxmlformats.org/officeDocument/2006/relationships" xmlns:p="http://schemas.openxmlformats.org/presentationml/2006/main" saveSubsetFonts="1" embedTrueTypeFonts="true">
+<p:presentation xmlns:a="http://schemas.openxmlformats.org/drawingml/2006/main" xmlns:r="http://schemas.openxmlformats.org/officeDocument/2006/relationships" xmlns:p="http://schemas.openxmlformats.org/presentationml/2006/main" embedTrueTypeFonts="1" saveSubsetFonts="1">
   <p:sldMasterIdLst>
     <p:sldMasterId id="2147483648" r:id="rId1"/>
   </p:sldMasterIdLst>
   <p:sldIdLst>
-    <p:sldId id="256" r:id="rId18"/>
-    <p:sldId id="257" r:id="rId19"/>
-    <p:sldId id="258" r:id="rId20"/>
-    <p:sldId id="259" r:id="rId21"/>
-    <p:sldId id="260" r:id="rId22"/>
-    <p:sldId id="261" r:id="rId23"/>
-    <p:sldId id="262" r:id="rId24"/>
-    <p:sldId id="263" r:id="rId25"/>
-    <p:sldId id="264" r:id="rId26"/>
-    <p:sldId id="265" r:id="rId27"/>
+    <p:sldId id="256" r:id="rId2"/>
+    <p:sldId id="257" r:id="rId3"/>
+    <p:sldId id="258" r:id="rId4"/>
+    <p:sldId id="259" r:id="rId5"/>
+    <p:sldId id="260" r:id="rId6"/>
+    <p:sldId id="261" r:id="rId7"/>
+    <p:sldId id="262" r:id="rId8"/>
+    <p:sldId id="263" r:id="rId9"/>
+    <p:sldId id="264" r:id="rId10"/>
+    <p:sldId id="265" r:id="rId11"/>
   </p:sldIdLst>
   <p:sldSz cx="18288000" cy="10287000"/>
   <p:notesSz cx="6858000" cy="9144000"/>
   <p:embeddedFontLst>
     <p:embeddedFont>
-      <p:font typeface="Nunito" charset="1" panose="00000500000000000000"/>
-      <p:regular r:id="rId6"/>
+      <p:font typeface="Calibri" panose="020F0502020204030204" pitchFamily="34" charset="0"/>
+      <p:regular r:id="rId12"/>
+      <p:bold r:id="rId13"/>
+      <p:italic r:id="rId14"/>
+      <p:boldItalic r:id="rId15"/>
     </p:embeddedFont>
     <p:embeddedFont>
-      <p:font typeface="Nunito Bold" charset="1" panose="00000800000000000000"/>
-      <p:regular r:id="rId7"/>
-    </p:embeddedFont>
-    <p:embeddedFont>
-      <p:font typeface="Arimo" charset="1" panose="020B0604020202020204"/>
-      <p:regular r:id="rId8"/>
-    </p:embeddedFont>
-    <p:embeddedFont>
-      <p:font typeface="Arimo Bold" charset="1" panose="020B0704020202020204"/>
-      <p:regular r:id="rId9"/>
-    </p:embeddedFont>
-    <p:embeddedFont>
-      <p:font typeface="Arimo Italics" charset="1" panose="020B0604020202090204"/>
-      <p:regular r:id="rId10"/>
-    </p:embeddedFont>
-    <p:embeddedFont>
-      <p:font typeface="Arimo Bold Italics" charset="1" panose="020B0704020202090204"/>
-      <p:regular r:id="rId11"/>
-    </p:embeddedFont>
-    <p:embeddedFont>
-      <p:font typeface="Nunito Bold" charset="1" panose="00000000000000000000"/>
-      <p:regular r:id="rId12"/>
-    </p:embeddedFont>
-    <p:embeddedFont>
-      <p:font typeface="Nunito Bold Bold" charset="1" panose="00000000000000000000"/>
-      <p:regular r:id="rId13"/>
-    </p:embeddedFont>
-    <p:embeddedFont>
-      <p:font typeface="Nunito Bold Italics" charset="1" panose="00000000000000000000"/>
-      <p:regular r:id="rId14"/>
-    </p:embeddedFont>
-    <p:embeddedFont>
-      <p:font typeface="Nunito Bold Bold Italics" charset="1" panose="00000000000000000000"/>
-      <p:regular r:id="rId15"/>
-    </p:embeddedFont>
-    <p:embeddedFont>
-      <p:font typeface="Noto Serif Display Black" charset="1" panose="02020A02080505020204"/>
+      <p:font typeface="Noto Serif Display Black" panose="020B0604020202020204"/>
       <p:regular r:id="rId16"/>
     </p:embeddedFont>
     <p:embeddedFont>
-      <p:font typeface="Noto Serif Display Black Italics" charset="1" panose="02020A02080505090204"/>
+      <p:font typeface="Nunito" pitchFamily="2" charset="0"/>
       <p:regular r:id="rId17"/>
+    </p:embeddedFont>
+    <p:embeddedFont>
+      <p:font typeface="Nunito Bold" charset="0"/>
+      <p:regular r:id="rId18"/>
     </p:embeddedFont>
   </p:embeddedFontLst>
   <p:defaultTextStyle>
@@ -163,6 +134,22 @@
       </a:defRPr>
     </a:lvl9pPr>
   </p:defaultTextStyle>
+  <p:extLst>
+    <p:ext uri="{EFAFB233-063F-42B5-8137-9DF3F51BA10A}">
+      <p15:sldGuideLst xmlns:p15="http://schemas.microsoft.com/office/powerpoint/2012/main">
+        <p15:guide id="1" orient="horz" pos="2160">
+          <p15:clr>
+            <a:srgbClr val="A4A3A4"/>
+          </p15:clr>
+        </p15:guide>
+        <p15:guide id="2" pos="2880">
+          <p15:clr>
+            <a:srgbClr val="A4A3A4"/>
+          </p15:clr>
+        </p15:guide>
+      </p15:sldGuideLst>
+    </p:ext>
+  </p:extLst>
 </p:presentation>
 </file>
 
@@ -204,10 +191,9 @@
           <a:lstStyle/>
           <a:p>
             <a:r>
-              <a:rPr lang="en-US" smtClean="0"/>
+              <a:rPr lang="en-US"/>
               <a:t>Click to edit Master title style</a:t>
             </a:r>
-            <a:endParaRPr lang="en-US"/>
           </a:p>
         </p:txBody>
       </p:sp>
@@ -323,10 +309,9 @@
           </a:lstStyle>
           <a:p>
             <a:r>
-              <a:rPr lang="en-US" smtClean="0"/>
+              <a:rPr lang="en-US"/>
               <a:t>Click to edit Master subtitle style</a:t>
             </a:r>
-            <a:endParaRPr lang="en-US"/>
           </a:p>
         </p:txBody>
       </p:sp>
@@ -348,7 +333,7 @@
             <a:fld id="{1D8BD707-D9CF-40AE-B4C6-C98DA3205C09}" type="datetimeFigureOut">
               <a:rPr lang="en-US" smtClean="0"/>
               <a:pPr/>
-              <a:t>8/1/2011</a:t>
+              <a:t>8/14/2023</a:t>
             </a:fld>
             <a:endParaRPr lang="en-US"/>
           </a:p>
@@ -438,10 +423,9 @@
           <a:lstStyle/>
           <a:p>
             <a:r>
-              <a:rPr lang="en-US" smtClean="0"/>
+              <a:rPr lang="en-US"/>
               <a:t>Click to edit Master title style</a:t>
             </a:r>
-            <a:endParaRPr lang="en-US"/>
           </a:p>
         </p:txBody>
       </p:sp>
@@ -462,38 +446,37 @@
           <a:p>
             <a:pPr lvl="0"/>
             <a:r>
-              <a:rPr lang="en-US" smtClean="0"/>
+              <a:rPr lang="en-US"/>
               <a:t>Click to edit Master text styles</a:t>
             </a:r>
           </a:p>
           <a:p>
             <a:pPr lvl="1"/>
             <a:r>
-              <a:rPr lang="en-US" smtClean="0"/>
+              <a:rPr lang="en-US"/>
               <a:t>Second level</a:t>
             </a:r>
           </a:p>
           <a:p>
             <a:pPr lvl="2"/>
             <a:r>
-              <a:rPr lang="en-US" smtClean="0"/>
+              <a:rPr lang="en-US"/>
               <a:t>Third level</a:t>
             </a:r>
           </a:p>
           <a:p>
             <a:pPr lvl="3"/>
             <a:r>
-              <a:rPr lang="en-US" smtClean="0"/>
+              <a:rPr lang="en-US"/>
               <a:t>Fourth level</a:t>
             </a:r>
           </a:p>
           <a:p>
             <a:pPr lvl="4"/>
             <a:r>
-              <a:rPr lang="en-US" smtClean="0"/>
+              <a:rPr lang="en-US"/>
               <a:t>Fifth level</a:t>
             </a:r>
-            <a:endParaRPr lang="en-US"/>
           </a:p>
         </p:txBody>
       </p:sp>
@@ -515,7 +498,7 @@
             <a:fld id="{1D8BD707-D9CF-40AE-B4C6-C98DA3205C09}" type="datetimeFigureOut">
               <a:rPr lang="en-US" smtClean="0"/>
               <a:pPr/>
-              <a:t>8/1/2011</a:t>
+              <a:t>8/14/2023</a:t>
             </a:fld>
             <a:endParaRPr lang="en-US"/>
           </a:p>
@@ -610,10 +593,9 @@
           <a:lstStyle/>
           <a:p>
             <a:r>
-              <a:rPr lang="en-US" smtClean="0"/>
+              <a:rPr lang="en-US"/>
               <a:t>Click to edit Master title style</a:t>
             </a:r>
-            <a:endParaRPr lang="en-US"/>
           </a:p>
         </p:txBody>
       </p:sp>
@@ -639,38 +621,37 @@
           <a:p>
             <a:pPr lvl="0"/>
             <a:r>
-              <a:rPr lang="en-US" smtClean="0"/>
+              <a:rPr lang="en-US"/>
               <a:t>Click to edit Master text styles</a:t>
             </a:r>
           </a:p>
           <a:p>
             <a:pPr lvl="1"/>
             <a:r>
-              <a:rPr lang="en-US" smtClean="0"/>
+              <a:rPr lang="en-US"/>
               <a:t>Second level</a:t>
             </a:r>
           </a:p>
           <a:p>
             <a:pPr lvl="2"/>
             <a:r>
-              <a:rPr lang="en-US" smtClean="0"/>
+              <a:rPr lang="en-US"/>
               <a:t>Third level</a:t>
             </a:r>
           </a:p>
           <a:p>
             <a:pPr lvl="3"/>
             <a:r>
-              <a:rPr lang="en-US" smtClean="0"/>
+              <a:rPr lang="en-US"/>
               <a:t>Fourth level</a:t>
             </a:r>
           </a:p>
           <a:p>
             <a:pPr lvl="4"/>
             <a:r>
-              <a:rPr lang="en-US" smtClean="0"/>
+              <a:rPr lang="en-US"/>
               <a:t>Fifth level</a:t>
             </a:r>
-            <a:endParaRPr lang="en-US"/>
           </a:p>
         </p:txBody>
       </p:sp>
@@ -692,7 +673,7 @@
             <a:fld id="{1D8BD707-D9CF-40AE-B4C6-C98DA3205C09}" type="datetimeFigureOut">
               <a:rPr lang="en-US" smtClean="0"/>
               <a:pPr/>
-              <a:t>8/1/2011</a:t>
+              <a:t>8/14/2023</a:t>
             </a:fld>
             <a:endParaRPr lang="en-US"/>
           </a:p>
@@ -782,10 +763,9 @@
           <a:lstStyle/>
           <a:p>
             <a:r>
-              <a:rPr lang="en-US" smtClean="0"/>
+              <a:rPr lang="en-US"/>
               <a:t>Click to edit Master title style</a:t>
             </a:r>
-            <a:endParaRPr lang="en-US"/>
           </a:p>
         </p:txBody>
       </p:sp>
@@ -806,38 +786,37 @@
           <a:p>
             <a:pPr lvl="0"/>
             <a:r>
-              <a:rPr lang="en-US" smtClean="0"/>
+              <a:rPr lang="en-US"/>
               <a:t>Click to edit Master text styles</a:t>
             </a:r>
           </a:p>
           <a:p>
             <a:pPr lvl="1"/>
             <a:r>
-              <a:rPr lang="en-US" smtClean="0"/>
+              <a:rPr lang="en-US"/>
               <a:t>Second level</a:t>
             </a:r>
           </a:p>
           <a:p>
             <a:pPr lvl="2"/>
             <a:r>
-              <a:rPr lang="en-US" smtClean="0"/>
+              <a:rPr lang="en-US"/>
               <a:t>Third level</a:t>
             </a:r>
           </a:p>
           <a:p>
             <a:pPr lvl="3"/>
             <a:r>
-              <a:rPr lang="en-US" smtClean="0"/>
+              <a:rPr lang="en-US"/>
               <a:t>Fourth level</a:t>
             </a:r>
           </a:p>
           <a:p>
             <a:pPr lvl="4"/>
             <a:r>
-              <a:rPr lang="en-US" smtClean="0"/>
+              <a:rPr lang="en-US"/>
               <a:t>Fifth level</a:t>
             </a:r>
-            <a:endParaRPr lang="en-US"/>
           </a:p>
         </p:txBody>
       </p:sp>
@@ -859,7 +838,7 @@
             <a:fld id="{1D8BD707-D9CF-40AE-B4C6-C98DA3205C09}" type="datetimeFigureOut">
               <a:rPr lang="en-US" smtClean="0"/>
               <a:pPr/>
-              <a:t>8/1/2011</a:t>
+              <a:t>8/14/2023</a:t>
             </a:fld>
             <a:endParaRPr lang="en-US"/>
           </a:p>
@@ -958,10 +937,9 @@
           </a:lstStyle>
           <a:p>
             <a:r>
-              <a:rPr lang="en-US" smtClean="0"/>
+              <a:rPr lang="en-US"/>
               <a:t>Click to edit Master title style</a:t>
             </a:r>
-            <a:endParaRPr lang="en-US"/>
           </a:p>
         </p:txBody>
       </p:sp>
@@ -1078,7 +1056,7 @@
           <a:p>
             <a:pPr lvl="0"/>
             <a:r>
-              <a:rPr lang="en-US" smtClean="0"/>
+              <a:rPr lang="en-US"/>
               <a:t>Click to edit Master text styles</a:t>
             </a:r>
           </a:p>
@@ -1102,7 +1080,7 @@
             <a:fld id="{1D8BD707-D9CF-40AE-B4C6-C98DA3205C09}" type="datetimeFigureOut">
               <a:rPr lang="en-US" smtClean="0"/>
               <a:pPr/>
-              <a:t>8/1/2011</a:t>
+              <a:t>8/14/2023</a:t>
             </a:fld>
             <a:endParaRPr lang="en-US"/>
           </a:p>
@@ -1192,10 +1170,9 @@
           <a:lstStyle/>
           <a:p>
             <a:r>
-              <a:rPr lang="en-US" smtClean="0"/>
+              <a:rPr lang="en-US"/>
               <a:t>Click to edit Master title style</a:t>
             </a:r>
-            <a:endParaRPr lang="en-US"/>
           </a:p>
         </p:txBody>
       </p:sp>
@@ -1249,38 +1226,37 @@
           <a:p>
             <a:pPr lvl="0"/>
             <a:r>
-              <a:rPr lang="en-US" smtClean="0"/>
+              <a:rPr lang="en-US"/>
               <a:t>Click to edit Master text styles</a:t>
             </a:r>
           </a:p>
           <a:p>
             <a:pPr lvl="1"/>
             <a:r>
-              <a:rPr lang="en-US" smtClean="0"/>
+              <a:rPr lang="en-US"/>
               <a:t>Second level</a:t>
             </a:r>
           </a:p>
           <a:p>
             <a:pPr lvl="2"/>
             <a:r>
-              <a:rPr lang="en-US" smtClean="0"/>
+              <a:rPr lang="en-US"/>
               <a:t>Third level</a:t>
             </a:r>
           </a:p>
           <a:p>
             <a:pPr lvl="3"/>
             <a:r>
-              <a:rPr lang="en-US" smtClean="0"/>
+              <a:rPr lang="en-US"/>
               <a:t>Fourth level</a:t>
             </a:r>
           </a:p>
           <a:p>
             <a:pPr lvl="4"/>
             <a:r>
-              <a:rPr lang="en-US" smtClean="0"/>
+              <a:rPr lang="en-US"/>
               <a:t>Fifth level</a:t>
             </a:r>
-            <a:endParaRPr lang="en-US"/>
           </a:p>
         </p:txBody>
       </p:sp>
@@ -1334,38 +1310,37 @@
           <a:p>
             <a:pPr lvl="0"/>
             <a:r>
-              <a:rPr lang="en-US" smtClean="0"/>
+              <a:rPr lang="en-US"/>
               <a:t>Click to edit Master text styles</a:t>
             </a:r>
           </a:p>
           <a:p>
             <a:pPr lvl="1"/>
             <a:r>
-              <a:rPr lang="en-US" smtClean="0"/>
+              <a:rPr lang="en-US"/>
               <a:t>Second level</a:t>
             </a:r>
           </a:p>
           <a:p>
             <a:pPr lvl="2"/>
             <a:r>
-              <a:rPr lang="en-US" smtClean="0"/>
+              <a:rPr lang="en-US"/>
               <a:t>Third level</a:t>
             </a:r>
           </a:p>
           <a:p>
             <a:pPr lvl="3"/>
             <a:r>
-              <a:rPr lang="en-US" smtClean="0"/>
+              <a:rPr lang="en-US"/>
               <a:t>Fourth level</a:t>
             </a:r>
           </a:p>
           <a:p>
             <a:pPr lvl="4"/>
             <a:r>
-              <a:rPr lang="en-US" smtClean="0"/>
+              <a:rPr lang="en-US"/>
               <a:t>Fifth level</a:t>
             </a:r>
-            <a:endParaRPr lang="en-US"/>
           </a:p>
         </p:txBody>
       </p:sp>
@@ -1387,7 +1362,7 @@
             <a:fld id="{1D8BD707-D9CF-40AE-B4C6-C98DA3205C09}" type="datetimeFigureOut">
               <a:rPr lang="en-US" smtClean="0"/>
               <a:pPr/>
-              <a:t>8/1/2011</a:t>
+              <a:t>8/14/2023</a:t>
             </a:fld>
             <a:endParaRPr lang="en-US"/>
           </a:p>
@@ -1481,10 +1456,9 @@
           </a:lstStyle>
           <a:p>
             <a:r>
-              <a:rPr lang="en-US" smtClean="0"/>
+              <a:rPr lang="en-US"/>
               <a:t>Click to edit Master title style</a:t>
             </a:r>
-            <a:endParaRPr lang="en-US"/>
           </a:p>
         </p:txBody>
       </p:sp>
@@ -1547,7 +1521,7 @@
           <a:p>
             <a:pPr lvl="0"/>
             <a:r>
-              <a:rPr lang="en-US" smtClean="0"/>
+              <a:rPr lang="en-US"/>
               <a:t>Click to edit Master text styles</a:t>
             </a:r>
           </a:p>
@@ -1603,38 +1577,37 @@
           <a:p>
             <a:pPr lvl="0"/>
             <a:r>
-              <a:rPr lang="en-US" smtClean="0"/>
+              <a:rPr lang="en-US"/>
               <a:t>Click to edit Master text styles</a:t>
             </a:r>
           </a:p>
           <a:p>
             <a:pPr lvl="1"/>
             <a:r>
-              <a:rPr lang="en-US" smtClean="0"/>
+              <a:rPr lang="en-US"/>
               <a:t>Second level</a:t>
             </a:r>
           </a:p>
           <a:p>
             <a:pPr lvl="2"/>
             <a:r>
-              <a:rPr lang="en-US" smtClean="0"/>
+              <a:rPr lang="en-US"/>
               <a:t>Third level</a:t>
             </a:r>
           </a:p>
           <a:p>
             <a:pPr lvl="3"/>
             <a:r>
-              <a:rPr lang="en-US" smtClean="0"/>
+              <a:rPr lang="en-US"/>
               <a:t>Fourth level</a:t>
             </a:r>
           </a:p>
           <a:p>
             <a:pPr lvl="4"/>
             <a:r>
-              <a:rPr lang="en-US" smtClean="0"/>
+              <a:rPr lang="en-US"/>
               <a:t>Fifth level</a:t>
             </a:r>
-            <a:endParaRPr lang="en-US"/>
           </a:p>
         </p:txBody>
       </p:sp>
@@ -1697,7 +1670,7 @@
           <a:p>
             <a:pPr lvl="0"/>
             <a:r>
-              <a:rPr lang="en-US" smtClean="0"/>
+              <a:rPr lang="en-US"/>
               <a:t>Click to edit Master text styles</a:t>
             </a:r>
           </a:p>
@@ -1753,38 +1726,37 @@
           <a:p>
             <a:pPr lvl="0"/>
             <a:r>
-              <a:rPr lang="en-US" smtClean="0"/>
+              <a:rPr lang="en-US"/>
               <a:t>Click to edit Master text styles</a:t>
             </a:r>
           </a:p>
           <a:p>
             <a:pPr lvl="1"/>
             <a:r>
-              <a:rPr lang="en-US" smtClean="0"/>
+              <a:rPr lang="en-US"/>
               <a:t>Second level</a:t>
             </a:r>
           </a:p>
           <a:p>
             <a:pPr lvl="2"/>
             <a:r>
-              <a:rPr lang="en-US" smtClean="0"/>
+              <a:rPr lang="en-US"/>
               <a:t>Third level</a:t>
             </a:r>
           </a:p>
           <a:p>
             <a:pPr lvl="3"/>
             <a:r>
-              <a:rPr lang="en-US" smtClean="0"/>
+              <a:rPr lang="en-US"/>
               <a:t>Fourth level</a:t>
             </a:r>
           </a:p>
           <a:p>
             <a:pPr lvl="4"/>
             <a:r>
-              <a:rPr lang="en-US" smtClean="0"/>
+              <a:rPr lang="en-US"/>
               <a:t>Fifth level</a:t>
             </a:r>
-            <a:endParaRPr lang="en-US"/>
           </a:p>
         </p:txBody>
       </p:sp>
@@ -1806,7 +1778,7 @@
             <a:fld id="{1D8BD707-D9CF-40AE-B4C6-C98DA3205C09}" type="datetimeFigureOut">
               <a:rPr lang="en-US" smtClean="0"/>
               <a:pPr/>
-              <a:t>8/1/2011</a:t>
+              <a:t>8/14/2023</a:t>
             </a:fld>
             <a:endParaRPr lang="en-US"/>
           </a:p>
@@ -1896,10 +1868,9 @@
           <a:lstStyle/>
           <a:p>
             <a:r>
-              <a:rPr lang="en-US" smtClean="0"/>
+              <a:rPr lang="en-US"/>
               <a:t>Click to edit Master title style</a:t>
             </a:r>
-            <a:endParaRPr lang="en-US"/>
           </a:p>
         </p:txBody>
       </p:sp>
@@ -1921,7 +1892,7 @@
             <a:fld id="{1D8BD707-D9CF-40AE-B4C6-C98DA3205C09}" type="datetimeFigureOut">
               <a:rPr lang="en-US" smtClean="0"/>
               <a:pPr/>
-              <a:t>8/1/2011</a:t>
+              <a:t>8/14/2023</a:t>
             </a:fld>
             <a:endParaRPr lang="en-US"/>
           </a:p>
@@ -2013,7 +1984,7 @@
             <a:fld id="{1D8BD707-D9CF-40AE-B4C6-C98DA3205C09}" type="datetimeFigureOut">
               <a:rPr lang="en-US" smtClean="0"/>
               <a:pPr/>
-              <a:t>8/1/2011</a:t>
+              <a:t>8/14/2023</a:t>
             </a:fld>
             <a:endParaRPr lang="en-US"/>
           </a:p>
@@ -2112,10 +2083,9 @@
           </a:lstStyle>
           <a:p>
             <a:r>
-              <a:rPr lang="en-US" smtClean="0"/>
+              <a:rPr lang="en-US"/>
               <a:t>Click to edit Master title style</a:t>
             </a:r>
-            <a:endParaRPr lang="en-US"/>
           </a:p>
         </p:txBody>
       </p:sp>
@@ -2169,38 +2139,37 @@
           <a:p>
             <a:pPr lvl="0"/>
             <a:r>
-              <a:rPr lang="en-US" smtClean="0"/>
+              <a:rPr lang="en-US"/>
               <a:t>Click to edit Master text styles</a:t>
             </a:r>
           </a:p>
           <a:p>
             <a:pPr lvl="1"/>
             <a:r>
-              <a:rPr lang="en-US" smtClean="0"/>
+              <a:rPr lang="en-US"/>
               <a:t>Second level</a:t>
             </a:r>
           </a:p>
           <a:p>
             <a:pPr lvl="2"/>
             <a:r>
-              <a:rPr lang="en-US" smtClean="0"/>
+              <a:rPr lang="en-US"/>
               <a:t>Third level</a:t>
             </a:r>
           </a:p>
           <a:p>
             <a:pPr lvl="3"/>
             <a:r>
-              <a:rPr lang="en-US" smtClean="0"/>
+              <a:rPr lang="en-US"/>
               <a:t>Fourth level</a:t>
             </a:r>
           </a:p>
           <a:p>
             <a:pPr lvl="4"/>
             <a:r>
-              <a:rPr lang="en-US" smtClean="0"/>
+              <a:rPr lang="en-US"/>
               <a:t>Fifth level</a:t>
             </a:r>
-            <a:endParaRPr lang="en-US"/>
           </a:p>
         </p:txBody>
       </p:sp>
@@ -2263,7 +2232,7 @@
           <a:p>
             <a:pPr lvl="0"/>
             <a:r>
-              <a:rPr lang="en-US" smtClean="0"/>
+              <a:rPr lang="en-US"/>
               <a:t>Click to edit Master text styles</a:t>
             </a:r>
           </a:p>
@@ -2287,7 +2256,7 @@
             <a:fld id="{1D8BD707-D9CF-40AE-B4C6-C98DA3205C09}" type="datetimeFigureOut">
               <a:rPr lang="en-US" smtClean="0"/>
               <a:pPr/>
-              <a:t>8/1/2011</a:t>
+              <a:t>8/14/2023</a:t>
             </a:fld>
             <a:endParaRPr lang="en-US"/>
           </a:p>
@@ -2386,10 +2355,9 @@
           </a:lstStyle>
           <a:p>
             <a:r>
-              <a:rPr lang="en-US" smtClean="0"/>
+              <a:rPr lang="en-US"/>
               <a:t>Click to edit Master title style</a:t>
             </a:r>
-            <a:endParaRPr lang="en-US"/>
           </a:p>
         </p:txBody>
       </p:sp>
@@ -2513,7 +2481,7 @@
           <a:p>
             <a:pPr lvl="0"/>
             <a:r>
-              <a:rPr lang="en-US" smtClean="0"/>
+              <a:rPr lang="en-US"/>
               <a:t>Click to edit Master text styles</a:t>
             </a:r>
           </a:p>
@@ -2537,7 +2505,7 @@
             <a:fld id="{1D8BD707-D9CF-40AE-B4C6-C98DA3205C09}" type="datetimeFigureOut">
               <a:rPr lang="en-US" smtClean="0"/>
               <a:pPr/>
-              <a:t>8/1/2011</a:t>
+              <a:t>8/14/2023</a:t>
             </a:fld>
             <a:endParaRPr lang="en-US"/>
           </a:p>
@@ -2642,10 +2610,9 @@
           <a:lstStyle/>
           <a:p>
             <a:r>
-              <a:rPr lang="en-US" smtClean="0"/>
+              <a:rPr lang="en-US"/>
               <a:t>Click to edit Master title style</a:t>
             </a:r>
-            <a:endParaRPr lang="en-US"/>
           </a:p>
         </p:txBody>
       </p:sp>
@@ -2676,38 +2643,37 @@
           <a:p>
             <a:pPr lvl="0"/>
             <a:r>
-              <a:rPr lang="en-US" smtClean="0"/>
+              <a:rPr lang="en-US"/>
               <a:t>Click to edit Master text styles</a:t>
             </a:r>
           </a:p>
           <a:p>
             <a:pPr lvl="1"/>
             <a:r>
-              <a:rPr lang="en-US" smtClean="0"/>
+              <a:rPr lang="en-US"/>
               <a:t>Second level</a:t>
             </a:r>
           </a:p>
           <a:p>
             <a:pPr lvl="2"/>
             <a:r>
-              <a:rPr lang="en-US" smtClean="0"/>
+              <a:rPr lang="en-US"/>
               <a:t>Third level</a:t>
             </a:r>
           </a:p>
           <a:p>
             <a:pPr lvl="3"/>
             <a:r>
-              <a:rPr lang="en-US" smtClean="0"/>
+              <a:rPr lang="en-US"/>
               <a:t>Fourth level</a:t>
             </a:r>
           </a:p>
           <a:p>
             <a:pPr lvl="4"/>
             <a:r>
-              <a:rPr lang="en-US" smtClean="0"/>
+              <a:rPr lang="en-US"/>
               <a:t>Fifth level</a:t>
             </a:r>
-            <a:endParaRPr lang="en-US"/>
           </a:p>
         </p:txBody>
       </p:sp>
@@ -2747,7 +2713,7 @@
             <a:fld id="{1D8BD707-D9CF-40AE-B4C6-C98DA3205C09}" type="datetimeFigureOut">
               <a:rPr lang="en-US" smtClean="0"/>
               <a:pPr/>
-              <a:t>8/1/2011</a:t>
+              <a:t>8/14/2023</a:t>
             </a:fld>
             <a:endParaRPr lang="en-US"/>
           </a:p>
@@ -3102,13 +3068,14 @@
 </file>
 
 <file path=ppt/slides/slide1.xml><?xml version="1.0" encoding="utf-8"?>
-<p:sld xmlns:p="http://schemas.openxmlformats.org/presentationml/2006/main" xmlns:a="http://schemas.openxmlformats.org/drawingml/2006/main" xmlns:r="http://schemas.openxmlformats.org/officeDocument/2006/relationships">
+<p:sld xmlns:a="http://schemas.openxmlformats.org/drawingml/2006/main" xmlns:r="http://schemas.openxmlformats.org/officeDocument/2006/relationships" xmlns:p="http://schemas.openxmlformats.org/presentationml/2006/main">
   <p:cSld>
     <p:bg>
       <p:bgPr>
         <a:solidFill>
           <a:srgbClr val="FFFEFD"/>
         </a:solidFill>
+        <a:effectLst/>
       </p:bgPr>
     </p:bg>
     <p:spTree>
@@ -3127,12 +3094,12 @@
       </p:grpSpPr>
       <p:sp>
         <p:nvSpPr>
-          <p:cNvPr name="Freeform 2" id="2"/>
+          <p:cNvPr id="2" name="Freeform 2"/>
           <p:cNvSpPr/>
           <p:nvPr/>
         </p:nvSpPr>
         <p:spPr>
-          <a:xfrm flipH="false" flipV="false" rot="9938805">
+          <a:xfrm rot="9938805">
             <a:off x="12918970" y="8167940"/>
             <a:ext cx="4393392" cy="2180720"/>
           </a:xfrm>
@@ -3141,9 +3108,9 @@
             <a:gdLst/>
             <a:ahLst/>
             <a:cxnLst/>
-            <a:rect r="r" b="b" t="t" l="l"/>
+            <a:rect l="l" t="t" r="r" b="b"/>
             <a:pathLst>
-              <a:path h="2180720" w="4393392">
+              <a:path w="4393392" h="2180720">
                 <a:moveTo>
                   <a:pt x="0" y="0"/>
                 </a:moveTo>
@@ -3172,19 +3139,19 @@
               </a:extLst>
             </a:blip>
             <a:stretch>
-              <a:fillRect l="0" t="0" r="0" b="0"/>
+              <a:fillRect/>
             </a:stretch>
           </a:blipFill>
         </p:spPr>
       </p:sp>
       <p:sp>
         <p:nvSpPr>
-          <p:cNvPr name="Freeform 3" id="3"/>
+          <p:cNvPr id="3" name="Freeform 3"/>
           <p:cNvSpPr/>
           <p:nvPr/>
         </p:nvSpPr>
         <p:spPr>
-          <a:xfrm flipH="false" flipV="false" rot="-3677179">
+          <a:xfrm rot="-3677179">
             <a:off x="14593765" y="-444088"/>
             <a:ext cx="3856035" cy="5264212"/>
           </a:xfrm>
@@ -3193,9 +3160,9 @@
             <a:gdLst/>
             <a:ahLst/>
             <a:cxnLst/>
-            <a:rect r="r" b="b" t="t" l="l"/>
+            <a:rect l="l" t="t" r="r" b="b"/>
             <a:pathLst>
-              <a:path h="5264212" w="3856035">
+              <a:path w="3856035" h="5264212">
                 <a:moveTo>
                   <a:pt x="0" y="0"/>
                 </a:moveTo>
@@ -3224,19 +3191,19 @@
               </a:extLst>
             </a:blip>
             <a:stretch>
-              <a:fillRect l="0" t="0" r="0" b="0"/>
+              <a:fillRect/>
             </a:stretch>
           </a:blipFill>
         </p:spPr>
       </p:sp>
       <p:sp>
         <p:nvSpPr>
-          <p:cNvPr name="Freeform 4" id="4"/>
+          <p:cNvPr id="4" name="Freeform 4"/>
           <p:cNvSpPr/>
           <p:nvPr/>
         </p:nvSpPr>
         <p:spPr>
-          <a:xfrm flipH="false" flipV="false" rot="225268">
+          <a:xfrm rot="225268">
             <a:off x="12750156" y="924269"/>
             <a:ext cx="3738709" cy="1004778"/>
           </a:xfrm>
@@ -3245,9 +3212,9 @@
             <a:gdLst/>
             <a:ahLst/>
             <a:cxnLst/>
-            <a:rect r="r" b="b" t="t" l="l"/>
+            <a:rect l="l" t="t" r="r" b="b"/>
             <a:pathLst>
-              <a:path h="1004778" w="3738709">
+              <a:path w="3738709" h="1004778">
                 <a:moveTo>
                   <a:pt x="0" y="0"/>
                 </a:moveTo>
@@ -3276,19 +3243,19 @@
               </a:extLst>
             </a:blip>
             <a:stretch>
-              <a:fillRect l="0" t="0" r="0" b="0"/>
+              <a:fillRect/>
             </a:stretch>
           </a:blipFill>
         </p:spPr>
       </p:sp>
       <p:sp>
         <p:nvSpPr>
-          <p:cNvPr name="Freeform 5" id="5"/>
+          <p:cNvPr id="5" name="Freeform 5"/>
           <p:cNvSpPr/>
           <p:nvPr/>
         </p:nvSpPr>
         <p:spPr>
-          <a:xfrm flipH="true" flipV="false" rot="-2205468">
+          <a:xfrm rot="-2205468" flipH="1">
             <a:off x="-1038632" y="7657090"/>
             <a:ext cx="3384944" cy="4019726"/>
           </a:xfrm>
@@ -3297,9 +3264,9 @@
             <a:gdLst/>
             <a:ahLst/>
             <a:cxnLst/>
-            <a:rect r="r" b="b" t="t" l="l"/>
+            <a:rect l="l" t="t" r="r" b="b"/>
             <a:pathLst>
-              <a:path h="4019726" w="3384944">
+              <a:path w="3384944" h="4019726">
                 <a:moveTo>
                   <a:pt x="3384944" y="0"/>
                 </a:moveTo>
@@ -3328,19 +3295,19 @@
               </a:extLst>
             </a:blip>
             <a:stretch>
-              <a:fillRect l="0" t="0" r="0" b="0"/>
+              <a:fillRect/>
             </a:stretch>
           </a:blipFill>
         </p:spPr>
       </p:sp>
       <p:sp>
         <p:nvSpPr>
-          <p:cNvPr name="Freeform 6" id="6"/>
+          <p:cNvPr id="6" name="Freeform 6"/>
           <p:cNvSpPr/>
           <p:nvPr/>
         </p:nvSpPr>
         <p:spPr>
-          <a:xfrm flipH="false" flipV="false" rot="0">
+          <a:xfrm>
             <a:off x="-857816" y="5143500"/>
             <a:ext cx="3657600" cy="2034956"/>
           </a:xfrm>
@@ -3349,9 +3316,9 @@
             <a:gdLst/>
             <a:ahLst/>
             <a:cxnLst/>
-            <a:rect r="r" b="b" t="t" l="l"/>
+            <a:rect l="l" t="t" r="r" b="b"/>
             <a:pathLst>
-              <a:path h="2034956" w="3657600">
+              <a:path w="3657600" h="2034956">
                 <a:moveTo>
                   <a:pt x="0" y="0"/>
                 </a:moveTo>
@@ -3380,19 +3347,19 @@
               </a:extLst>
             </a:blip>
             <a:stretch>
-              <a:fillRect l="0" t="0" r="0" b="0"/>
+              <a:fillRect/>
             </a:stretch>
           </a:blipFill>
         </p:spPr>
       </p:sp>
       <p:sp>
         <p:nvSpPr>
-          <p:cNvPr name="Freeform 7" id="7"/>
+          <p:cNvPr id="7" name="Freeform 7"/>
           <p:cNvSpPr/>
           <p:nvPr/>
         </p:nvSpPr>
         <p:spPr>
-          <a:xfrm flipH="false" flipV="false" rot="0">
+          <a:xfrm>
             <a:off x="1028700" y="-538483"/>
             <a:ext cx="3542168" cy="3930284"/>
           </a:xfrm>
@@ -3401,9 +3368,9 @@
             <a:gdLst/>
             <a:ahLst/>
             <a:cxnLst/>
-            <a:rect r="r" b="b" t="t" l="l"/>
+            <a:rect l="l" t="t" r="r" b="b"/>
             <a:pathLst>
-              <a:path h="3930284" w="3542168">
+              <a:path w="3542168" h="3930284">
                 <a:moveTo>
                   <a:pt x="0" y="0"/>
                 </a:moveTo>
@@ -3432,19 +3399,19 @@
               </a:extLst>
             </a:blip>
             <a:stretch>
-              <a:fillRect l="0" t="0" r="0" b="0"/>
+              <a:fillRect/>
             </a:stretch>
           </a:blipFill>
         </p:spPr>
       </p:sp>
       <p:sp>
         <p:nvSpPr>
-          <p:cNvPr name="Freeform 8" id="8"/>
+          <p:cNvPr id="8" name="Freeform 8"/>
           <p:cNvSpPr/>
           <p:nvPr/>
         </p:nvSpPr>
         <p:spPr>
-          <a:xfrm flipH="false" flipV="false" rot="100047">
+          <a:xfrm rot="100047">
             <a:off x="3730765" y="5966965"/>
             <a:ext cx="10788371" cy="2117218"/>
           </a:xfrm>
@@ -3453,9 +3420,9 @@
             <a:gdLst/>
             <a:ahLst/>
             <a:cxnLst/>
-            <a:rect r="r" b="b" t="t" l="l"/>
+            <a:rect l="l" t="t" r="r" b="b"/>
             <a:pathLst>
-              <a:path h="2117218" w="10788371">
+              <a:path w="10788371" h="2117218">
                 <a:moveTo>
                   <a:pt x="0" y="0"/>
                 </a:moveTo>
@@ -3484,19 +3451,19 @@
               </a:extLst>
             </a:blip>
             <a:stretch>
-              <a:fillRect l="0" t="0" r="0" b="0"/>
+              <a:fillRect/>
             </a:stretch>
           </a:blipFill>
         </p:spPr>
       </p:sp>
       <p:sp>
         <p:nvSpPr>
-          <p:cNvPr name="TextBox 9" id="9"/>
-          <p:cNvSpPr txBox="true"/>
+          <p:cNvPr id="9" name="TextBox 9"/>
+          <p:cNvSpPr txBox="1"/>
           <p:nvPr/>
         </p:nvSpPr>
         <p:spPr>
-          <a:xfrm rot="0">
+          <a:xfrm>
             <a:off x="4440100" y="6667363"/>
             <a:ext cx="9407800" cy="695871"/>
           </a:xfrm>
@@ -3505,7 +3472,7 @@
           </a:prstGeom>
         </p:spPr>
         <p:txBody>
-          <a:bodyPr anchor="t" rtlCol="false" tIns="0" lIns="0" bIns="0" rIns="0">
+          <a:bodyPr lIns="0" tIns="0" rIns="0" bIns="0" rtlCol="0" anchor="t">
             <a:spAutoFit/>
           </a:bodyPr>
           <a:lstStyle/>
@@ -3532,12 +3499,12 @@
       </p:sp>
       <p:sp>
         <p:nvSpPr>
-          <p:cNvPr name="TextBox 10" id="10"/>
-          <p:cNvSpPr txBox="true"/>
+          <p:cNvPr id="10" name="TextBox 10"/>
+          <p:cNvSpPr txBox="1"/>
           <p:nvPr/>
         </p:nvSpPr>
         <p:spPr>
-          <a:xfrm rot="0">
+          <a:xfrm>
             <a:off x="1725758" y="3197850"/>
             <a:ext cx="14836484" cy="2803326"/>
           </a:xfrm>
@@ -3546,7 +3513,7 @@
           </a:prstGeom>
         </p:spPr>
         <p:txBody>
-          <a:bodyPr anchor="t" rtlCol="false" tIns="0" lIns="0" bIns="0" rIns="0">
+          <a:bodyPr lIns="0" tIns="0" rIns="0" bIns="0" rtlCol="0" anchor="t">
             <a:spAutoFit/>
           </a:bodyPr>
           <a:lstStyle/>
@@ -3593,13 +3560,14 @@
 </file>
 
 <file path=ppt/slides/slide10.xml><?xml version="1.0" encoding="utf-8"?>
-<p:sld xmlns:p="http://schemas.openxmlformats.org/presentationml/2006/main" xmlns:a="http://schemas.openxmlformats.org/drawingml/2006/main" xmlns:r="http://schemas.openxmlformats.org/officeDocument/2006/relationships">
+<p:sld xmlns:a="http://schemas.openxmlformats.org/drawingml/2006/main" xmlns:r="http://schemas.openxmlformats.org/officeDocument/2006/relationships" xmlns:p="http://schemas.openxmlformats.org/presentationml/2006/main">
   <p:cSld>
     <p:bg>
       <p:bgPr>
         <a:solidFill>
           <a:srgbClr val="FFE6BF"/>
         </a:solidFill>
+        <a:effectLst/>
       </p:bgPr>
     </p:bg>
     <p:spTree>
@@ -3618,12 +3586,12 @@
       </p:grpSpPr>
       <p:sp>
         <p:nvSpPr>
-          <p:cNvPr name="Freeform 2" id="2"/>
+          <p:cNvPr id="2" name="Freeform 2"/>
           <p:cNvSpPr/>
           <p:nvPr/>
         </p:nvSpPr>
         <p:spPr>
-          <a:xfrm flipH="false" flipV="false" rot="0">
+          <a:xfrm>
             <a:off x="0" y="1028700"/>
             <a:ext cx="18288000" cy="5422409"/>
           </a:xfrm>
@@ -3632,9 +3600,9 @@
             <a:gdLst/>
             <a:ahLst/>
             <a:cxnLst/>
-            <a:rect r="r" b="b" t="t" l="l"/>
+            <a:rect l="l" t="t" r="r" b="b"/>
             <a:pathLst>
-              <a:path h="5422409" w="18288000">
+              <a:path w="18288000" h="5422409">
                 <a:moveTo>
                   <a:pt x="0" y="0"/>
                 </a:moveTo>
@@ -3657,19 +3625,19 @@
           <a:blipFill>
             <a:blip r:embed="rId2"/>
             <a:stretch>
-              <a:fillRect l="0" t="0" r="0" b="0"/>
+              <a:fillRect/>
             </a:stretch>
           </a:blipFill>
         </p:spPr>
       </p:sp>
       <p:sp>
         <p:nvSpPr>
-          <p:cNvPr name="TextBox 3" id="3"/>
-          <p:cNvSpPr txBox="true"/>
+          <p:cNvPr id="3" name="TextBox 3"/>
+          <p:cNvSpPr txBox="1"/>
           <p:nvPr/>
         </p:nvSpPr>
         <p:spPr>
-          <a:xfrm rot="0">
+          <a:xfrm>
             <a:off x="5625765" y="8479636"/>
             <a:ext cx="7036469" cy="778664"/>
           </a:xfrm>
@@ -3678,7 +3646,7 @@
           </a:prstGeom>
         </p:spPr>
         <p:txBody>
-          <a:bodyPr anchor="t" rtlCol="false" tIns="0" lIns="0" bIns="0" rIns="0">
+          <a:bodyPr lIns="0" tIns="0" rIns="0" bIns="0" rtlCol="0" anchor="t">
             <a:spAutoFit/>
           </a:bodyPr>
           <a:lstStyle/>
@@ -3709,13 +3677,14 @@
 </file>
 
 <file path=ppt/slides/slide2.xml><?xml version="1.0" encoding="utf-8"?>
-<p:sld xmlns:p="http://schemas.openxmlformats.org/presentationml/2006/main" xmlns:a="http://schemas.openxmlformats.org/drawingml/2006/main" xmlns:r="http://schemas.openxmlformats.org/officeDocument/2006/relationships">
+<p:sld xmlns:a="http://schemas.openxmlformats.org/drawingml/2006/main" xmlns:r="http://schemas.openxmlformats.org/officeDocument/2006/relationships" xmlns:p="http://schemas.openxmlformats.org/presentationml/2006/main">
   <p:cSld>
     <p:bg>
       <p:bgPr>
         <a:solidFill>
           <a:srgbClr val="FACAAC"/>
         </a:solidFill>
+        <a:effectLst/>
       </p:bgPr>
     </p:bg>
     <p:spTree>
@@ -3734,12 +3703,12 @@
       </p:grpSpPr>
       <p:sp>
         <p:nvSpPr>
-          <p:cNvPr name="Freeform 2" id="2"/>
+          <p:cNvPr id="2" name="Freeform 2"/>
           <p:cNvSpPr/>
           <p:nvPr/>
         </p:nvSpPr>
         <p:spPr>
-          <a:xfrm flipH="false" flipV="false" rot="0">
+          <a:xfrm>
             <a:off x="9705176" y="6884691"/>
             <a:ext cx="5590942" cy="4747218"/>
           </a:xfrm>
@@ -3748,9 +3717,9 @@
             <a:gdLst/>
             <a:ahLst/>
             <a:cxnLst/>
-            <a:rect r="r" b="b" t="t" l="l"/>
+            <a:rect l="l" t="t" r="r" b="b"/>
             <a:pathLst>
-              <a:path h="4747218" w="5590942">
+              <a:path w="5590942" h="4747218">
                 <a:moveTo>
                   <a:pt x="0" y="0"/>
                 </a:moveTo>
@@ -3779,19 +3748,19 @@
               </a:extLst>
             </a:blip>
             <a:stretch>
-              <a:fillRect l="0" t="0" r="0" b="0"/>
+              <a:fillRect/>
             </a:stretch>
           </a:blipFill>
         </p:spPr>
       </p:sp>
       <p:sp>
         <p:nvSpPr>
-          <p:cNvPr name="Freeform 3" id="3"/>
+          <p:cNvPr id="3" name="Freeform 3"/>
           <p:cNvSpPr/>
           <p:nvPr/>
         </p:nvSpPr>
         <p:spPr>
-          <a:xfrm flipH="false" flipV="false" rot="-5400000">
+          <a:xfrm rot="-5400000">
             <a:off x="10937631" y="4032147"/>
             <a:ext cx="1053596" cy="2622071"/>
           </a:xfrm>
@@ -3800,9 +3769,9 @@
             <a:gdLst/>
             <a:ahLst/>
             <a:cxnLst/>
-            <a:rect r="r" b="b" t="t" l="l"/>
+            <a:rect l="l" t="t" r="r" b="b"/>
             <a:pathLst>
-              <a:path h="2622071" w="1053596">
+              <a:path w="1053596" h="2622071">
                 <a:moveTo>
                   <a:pt x="0" y="0"/>
                 </a:moveTo>
@@ -3831,19 +3800,19 @@
               </a:extLst>
             </a:blip>
             <a:stretch>
-              <a:fillRect l="0" t="0" r="0" b="0"/>
+              <a:fillRect/>
             </a:stretch>
           </a:blipFill>
         </p:spPr>
       </p:sp>
       <p:sp>
         <p:nvSpPr>
-          <p:cNvPr name="Freeform 4" id="4"/>
+          <p:cNvPr id="4" name="Freeform 4"/>
           <p:cNvSpPr/>
           <p:nvPr/>
         </p:nvSpPr>
         <p:spPr>
-          <a:xfrm flipH="false" flipV="false" rot="0">
+          <a:xfrm>
             <a:off x="555415" y="3016371"/>
             <a:ext cx="7495607" cy="7600108"/>
           </a:xfrm>
@@ -3852,9 +3821,9 @@
             <a:gdLst/>
             <a:ahLst/>
             <a:cxnLst/>
-            <a:rect r="r" b="b" t="t" l="l"/>
+            <a:rect l="l" t="t" r="r" b="b"/>
             <a:pathLst>
-              <a:path h="7600108" w="7495607">
+              <a:path w="7495607" h="7600108">
                 <a:moveTo>
                   <a:pt x="0" y="0"/>
                 </a:moveTo>
@@ -3883,19 +3852,19 @@
               </a:extLst>
             </a:blip>
             <a:stretch>
-              <a:fillRect l="0" t="0" r="0" b="0"/>
+              <a:fillRect/>
             </a:stretch>
           </a:blipFill>
         </p:spPr>
       </p:sp>
       <p:sp>
         <p:nvSpPr>
-          <p:cNvPr name="Freeform 5" id="5"/>
+          <p:cNvPr id="5" name="Freeform 5"/>
           <p:cNvSpPr/>
           <p:nvPr/>
         </p:nvSpPr>
         <p:spPr>
-          <a:xfrm flipH="false" flipV="false" rot="0">
+          <a:xfrm>
             <a:off x="0" y="2902392"/>
             <a:ext cx="18288000" cy="3752962"/>
           </a:xfrm>
@@ -3904,9 +3873,9 @@
             <a:gdLst/>
             <a:ahLst/>
             <a:cxnLst/>
-            <a:rect r="r" b="b" t="t" l="l"/>
+            <a:rect l="l" t="t" r="r" b="b"/>
             <a:pathLst>
-              <a:path h="3752962" w="18288000">
+              <a:path w="18288000" h="3752962">
                 <a:moveTo>
                   <a:pt x="0" y="0"/>
                 </a:moveTo>
@@ -3929,19 +3898,19 @@
           <a:blipFill>
             <a:blip r:embed="rId8"/>
             <a:stretch>
-              <a:fillRect l="0" t="0" r="0" b="0"/>
+              <a:fillRect/>
             </a:stretch>
           </a:blipFill>
         </p:spPr>
       </p:sp>
       <p:sp>
         <p:nvSpPr>
-          <p:cNvPr name="TextBox 6" id="6"/>
-          <p:cNvSpPr txBox="true"/>
+          <p:cNvPr id="6" name="TextBox 6"/>
+          <p:cNvSpPr txBox="1"/>
           <p:nvPr/>
         </p:nvSpPr>
         <p:spPr>
-          <a:xfrm rot="0">
+          <a:xfrm>
             <a:off x="1230235" y="842400"/>
             <a:ext cx="7152628" cy="1149277"/>
           </a:xfrm>
@@ -3950,7 +3919,7 @@
           </a:prstGeom>
         </p:spPr>
         <p:txBody>
-          <a:bodyPr anchor="t" rtlCol="false" tIns="0" lIns="0" bIns="0" rIns="0">
+          <a:bodyPr lIns="0" tIns="0" rIns="0" bIns="0" rtlCol="0" anchor="t">
             <a:spAutoFit/>
           </a:bodyPr>
           <a:lstStyle/>
@@ -3974,12 +3943,12 @@
       </p:sp>
       <p:sp>
         <p:nvSpPr>
-          <p:cNvPr name="TextBox 7" id="7"/>
-          <p:cNvSpPr txBox="true"/>
+          <p:cNvPr id="7" name="TextBox 7"/>
+          <p:cNvSpPr txBox="1"/>
           <p:nvPr/>
         </p:nvSpPr>
         <p:spPr>
-          <a:xfrm rot="0">
+          <a:xfrm>
             <a:off x="1966533" y="7377683"/>
             <a:ext cx="4673371" cy="1672798"/>
           </a:xfrm>
@@ -3988,7 +3957,7 @@
           </a:prstGeom>
         </p:spPr>
         <p:txBody>
-          <a:bodyPr anchor="t" rtlCol="false" tIns="0" lIns="0" bIns="0" rIns="0">
+          <a:bodyPr lIns="0" tIns="0" rIns="0" bIns="0" rtlCol="0" anchor="t">
             <a:spAutoFit/>
           </a:bodyPr>
           <a:lstStyle/>
@@ -4035,13 +4004,14 @@
 </file>
 
 <file path=ppt/slides/slide3.xml><?xml version="1.0" encoding="utf-8"?>
-<p:sld xmlns:p="http://schemas.openxmlformats.org/presentationml/2006/main" xmlns:a="http://schemas.openxmlformats.org/drawingml/2006/main" xmlns:r="http://schemas.openxmlformats.org/officeDocument/2006/relationships">
+<p:sld xmlns:a="http://schemas.openxmlformats.org/drawingml/2006/main" xmlns:r="http://schemas.openxmlformats.org/officeDocument/2006/relationships" xmlns:p="http://schemas.openxmlformats.org/presentationml/2006/main">
   <p:cSld>
     <p:bg>
       <p:bgPr>
         <a:solidFill>
           <a:srgbClr val="FFE6BF"/>
         </a:solidFill>
+        <a:effectLst/>
       </p:bgPr>
     </p:bg>
     <p:spTree>
@@ -4060,7 +4030,7 @@
       </p:grpSpPr>
       <p:sp>
         <p:nvSpPr>
-          <p:cNvPr name="AutoShape 2" id="2"/>
+          <p:cNvPr id="2" name="AutoShape 2"/>
           <p:cNvSpPr/>
           <p:nvPr/>
         </p:nvSpPr>
@@ -4072,800 +4042,348 @@
           <a:prstGeom prst="line">
             <a:avLst/>
           </a:prstGeom>
-          <a:ln cap="flat" w="38100">
+          <a:ln w="38100" cap="flat">
             <a:solidFill>
               <a:srgbClr val="000000"/>
             </a:solidFill>
             <a:prstDash val="solid"/>
-            <a:headEnd type="none" len="sm" w="sm"/>
-            <a:tailEnd type="none" len="sm" w="sm"/>
+            <a:headEnd type="none" w="sm" len="sm"/>
+            <a:tailEnd type="none" w="sm" len="sm"/>
           </a:ln>
         </p:spPr>
       </p:sp>
-      <p:grpSp>
-        <p:nvGrpSpPr>
-          <p:cNvPr name="Group 3" id="3"/>
-          <p:cNvGrpSpPr/>
+      <p:sp>
+        <p:nvSpPr>
+          <p:cNvPr id="5" name="TextBox 5"/>
+          <p:cNvSpPr txBox="1"/>
           <p:nvPr/>
-        </p:nvGrpSpPr>
-        <p:grpSpPr>
-          <a:xfrm rot="0">
-            <a:off x="1807997" y="6660601"/>
-            <a:ext cx="5450041" cy="1033888"/>
-            <a:chOff x="0" y="0"/>
-            <a:chExt cx="1435402" cy="272300"/>
-          </a:xfrm>
-        </p:grpSpPr>
-        <p:sp>
-          <p:nvSpPr>
-            <p:cNvPr name="Freeform 4" id="4"/>
-            <p:cNvSpPr/>
-            <p:nvPr/>
-          </p:nvSpPr>
-          <p:spPr>
-            <a:xfrm flipH="false" flipV="false" rot="0">
-              <a:off x="0" y="0"/>
-              <a:ext cx="1435402" cy="272300"/>
-            </a:xfrm>
-            <a:custGeom>
-              <a:avLst/>
-              <a:gdLst/>
-              <a:ahLst/>
-              <a:cxnLst/>
-              <a:rect r="r" b="b" t="t" l="l"/>
-              <a:pathLst>
-                <a:path h="272300" w="1435402">
-                  <a:moveTo>
-                    <a:pt x="0" y="0"/>
-                  </a:moveTo>
-                  <a:lnTo>
-                    <a:pt x="1435402" y="0"/>
-                  </a:lnTo>
-                  <a:lnTo>
-                    <a:pt x="1435402" y="272300"/>
-                  </a:lnTo>
-                  <a:lnTo>
-                    <a:pt x="0" y="272300"/>
-                  </a:lnTo>
-                  <a:close/>
-                </a:path>
-              </a:pathLst>
-            </a:custGeom>
-            <a:solidFill>
-              <a:srgbClr val="FACAAC"/>
-            </a:solidFill>
-            <a:ln>
-              <a:noFill/>
-            </a:ln>
-          </p:spPr>
-        </p:sp>
-        <p:sp>
-          <p:nvSpPr>
-            <p:cNvPr name="TextBox 5" id="5"/>
-            <p:cNvSpPr txBox="true"/>
-            <p:nvPr/>
-          </p:nvSpPr>
-          <p:spPr>
-            <a:xfrm>
-              <a:off x="0" y="-57150"/>
-              <a:ext cx="812800" cy="869950"/>
-            </a:xfrm>
-            <a:prstGeom prst="rect">
-              <a:avLst/>
-            </a:prstGeom>
-          </p:spPr>
-          <p:txBody>
-            <a:bodyPr anchor="ctr" rtlCol="false" tIns="50800" lIns="50800" bIns="50800" rIns="50800"/>
-            <a:lstStyle/>
-            <a:p>
-              <a:pPr algn="ctr">
-                <a:lnSpc>
-                  <a:spcPts val="4899"/>
-                </a:lnSpc>
-                <a:spcBef>
-                  <a:spcPct val="0"/>
-                </a:spcBef>
-              </a:pPr>
-              <a:r>
-                <a:rPr lang="en-US" sz="3499">
-                  <a:solidFill>
-                    <a:srgbClr val="000000"/>
-                  </a:solidFill>
-                  <a:latin typeface="Nunito"/>
-                </a:rPr>
-                <a:t>isFlaggedFraud</a:t>
-              </a:r>
-            </a:p>
-          </p:txBody>
-        </p:sp>
-      </p:grpSp>
-      <p:grpSp>
-        <p:nvGrpSpPr>
-          <p:cNvPr name="Group 6" id="6"/>
-          <p:cNvGrpSpPr/>
+        </p:nvSpPr>
+        <p:spPr>
+          <a:xfrm>
+            <a:off x="2288729" y="6622501"/>
+            <a:ext cx="4833076" cy="1288979"/>
+          </a:xfrm>
+          <a:prstGeom prst="rect">
+            <a:avLst/>
+          </a:prstGeom>
+        </p:spPr>
+        <p:txBody>
+          <a:bodyPr lIns="50800" tIns="50800" rIns="50800" bIns="50800" rtlCol="0" anchor="ctr"/>
+          <a:lstStyle/>
+          <a:p>
+            <a:pPr algn="ctr">
+              <a:lnSpc>
+                <a:spcPts val="4899"/>
+              </a:lnSpc>
+              <a:spcBef>
+                <a:spcPct val="0"/>
+              </a:spcBef>
+            </a:pPr>
+            <a:r>
+              <a:rPr lang="en-US" sz="3499" dirty="0" err="1">
+                <a:solidFill>
+                  <a:srgbClr val="000000"/>
+                </a:solidFill>
+                <a:latin typeface="Nunito"/>
+              </a:rPr>
+              <a:t>isFlaggedFraud</a:t>
+            </a:r>
+            <a:endParaRPr lang="en-US" sz="3499" dirty="0">
+              <a:solidFill>
+                <a:srgbClr val="000000"/>
+              </a:solidFill>
+              <a:latin typeface="Nunito"/>
+            </a:endParaRPr>
+          </a:p>
+        </p:txBody>
+      </p:sp>
+      <p:sp>
+        <p:nvSpPr>
+          <p:cNvPr id="8" name="TextBox 8"/>
+          <p:cNvSpPr txBox="1"/>
           <p:nvPr/>
-        </p:nvGrpSpPr>
-        <p:grpSpPr>
-          <a:xfrm rot="0">
-            <a:off x="1807997" y="7694489"/>
-            <a:ext cx="5450041" cy="1033888"/>
-            <a:chOff x="0" y="0"/>
-            <a:chExt cx="1435402" cy="272300"/>
-          </a:xfrm>
-        </p:grpSpPr>
-        <p:sp>
-          <p:nvSpPr>
-            <p:cNvPr name="Freeform 7" id="7"/>
-            <p:cNvSpPr/>
-            <p:nvPr/>
-          </p:nvSpPr>
-          <p:spPr>
-            <a:xfrm flipH="false" flipV="false" rot="0">
-              <a:off x="0" y="0"/>
-              <a:ext cx="1435402" cy="272300"/>
-            </a:xfrm>
-            <a:custGeom>
-              <a:avLst/>
-              <a:gdLst/>
-              <a:ahLst/>
-              <a:cxnLst/>
-              <a:rect r="r" b="b" t="t" l="l"/>
-              <a:pathLst>
-                <a:path h="272300" w="1435402">
-                  <a:moveTo>
-                    <a:pt x="0" y="0"/>
-                  </a:moveTo>
-                  <a:lnTo>
-                    <a:pt x="1435402" y="0"/>
-                  </a:lnTo>
-                  <a:lnTo>
-                    <a:pt x="1435402" y="272300"/>
-                  </a:lnTo>
-                  <a:lnTo>
-                    <a:pt x="0" y="272300"/>
-                  </a:lnTo>
-                  <a:close/>
-                </a:path>
-              </a:pathLst>
-            </a:custGeom>
-            <a:solidFill>
-              <a:srgbClr val="FACAAC"/>
-            </a:solidFill>
-            <a:ln>
-              <a:noFill/>
-            </a:ln>
-          </p:spPr>
-        </p:sp>
-        <p:sp>
-          <p:nvSpPr>
-            <p:cNvPr name="TextBox 8" id="8"/>
-            <p:cNvSpPr txBox="true"/>
-            <p:nvPr/>
-          </p:nvSpPr>
-          <p:spPr>
-            <a:xfrm>
-              <a:off x="0" y="-57150"/>
-              <a:ext cx="812800" cy="869950"/>
-            </a:xfrm>
-            <a:prstGeom prst="rect">
-              <a:avLst/>
-            </a:prstGeom>
-          </p:spPr>
-          <p:txBody>
-            <a:bodyPr anchor="ctr" rtlCol="false" tIns="50800" lIns="50800" bIns="50800" rIns="50800"/>
-            <a:lstStyle/>
-            <a:p>
-              <a:pPr algn="ctr">
-                <a:lnSpc>
-                  <a:spcPts val="4899"/>
-                </a:lnSpc>
-                <a:spcBef>
-                  <a:spcPct val="0"/>
-                </a:spcBef>
-              </a:pPr>
-              <a:r>
-                <a:rPr lang="en-US" sz="3499">
-                  <a:solidFill>
-                    <a:srgbClr val="000000"/>
-                  </a:solidFill>
-                  <a:latin typeface="Nunito"/>
-                </a:rPr>
-                <a:t>isFraud</a:t>
-              </a:r>
-            </a:p>
-          </p:txBody>
-        </p:sp>
-      </p:grpSp>
-      <p:grpSp>
-        <p:nvGrpSpPr>
-          <p:cNvPr name="Group 9" id="9"/>
-          <p:cNvGrpSpPr/>
+        </p:nvSpPr>
+        <p:spPr>
+          <a:xfrm>
+            <a:off x="2774504" y="7723077"/>
+            <a:ext cx="3086100" cy="1033888"/>
+          </a:xfrm>
+          <a:prstGeom prst="rect">
+            <a:avLst/>
+          </a:prstGeom>
+        </p:spPr>
+        <p:txBody>
+          <a:bodyPr lIns="50800" tIns="50800" rIns="50800" bIns="50800" rtlCol="0" anchor="ctr"/>
+          <a:lstStyle/>
+          <a:p>
+            <a:pPr algn="ctr">
+              <a:lnSpc>
+                <a:spcPts val="4899"/>
+              </a:lnSpc>
+              <a:spcBef>
+                <a:spcPct val="0"/>
+              </a:spcBef>
+            </a:pPr>
+            <a:r>
+              <a:rPr lang="en-US" sz="3499" dirty="0" err="1">
+                <a:solidFill>
+                  <a:srgbClr val="000000"/>
+                </a:solidFill>
+                <a:latin typeface="Nunito"/>
+              </a:rPr>
+              <a:t>isFraud</a:t>
+            </a:r>
+            <a:endParaRPr lang="en-US" sz="3499" dirty="0">
+              <a:solidFill>
+                <a:srgbClr val="000000"/>
+              </a:solidFill>
+              <a:latin typeface="Nunito"/>
+            </a:endParaRPr>
+          </a:p>
+        </p:txBody>
+      </p:sp>
+      <p:sp>
+        <p:nvSpPr>
+          <p:cNvPr id="11" name="TextBox 11"/>
+          <p:cNvSpPr txBox="1"/>
           <p:nvPr/>
-        </p:nvGrpSpPr>
-        <p:grpSpPr>
-          <a:xfrm rot="0">
-            <a:off x="7258037" y="5588614"/>
-            <a:ext cx="5450041" cy="1033888"/>
-            <a:chOff x="0" y="0"/>
-            <a:chExt cx="1435402" cy="272300"/>
-          </a:xfrm>
-        </p:grpSpPr>
-        <p:sp>
-          <p:nvSpPr>
-            <p:cNvPr name="Freeform 10" id="10"/>
-            <p:cNvSpPr/>
-            <p:nvPr/>
-          </p:nvSpPr>
-          <p:spPr>
-            <a:xfrm flipH="false" flipV="false" rot="0">
-              <a:off x="0" y="0"/>
-              <a:ext cx="1435402" cy="272300"/>
-            </a:xfrm>
-            <a:custGeom>
-              <a:avLst/>
-              <a:gdLst/>
-              <a:ahLst/>
-              <a:cxnLst/>
-              <a:rect r="r" b="b" t="t" l="l"/>
-              <a:pathLst>
-                <a:path h="272300" w="1435402">
-                  <a:moveTo>
-                    <a:pt x="0" y="0"/>
-                  </a:moveTo>
-                  <a:lnTo>
-                    <a:pt x="1435402" y="0"/>
-                  </a:lnTo>
-                  <a:lnTo>
-                    <a:pt x="1435402" y="272300"/>
-                  </a:lnTo>
-                  <a:lnTo>
-                    <a:pt x="0" y="272300"/>
-                  </a:lnTo>
-                  <a:close/>
-                </a:path>
-              </a:pathLst>
-            </a:custGeom>
-            <a:solidFill>
-              <a:srgbClr val="FACAAC"/>
-            </a:solidFill>
-            <a:ln>
-              <a:noFill/>
-            </a:ln>
-          </p:spPr>
-        </p:sp>
-        <p:sp>
-          <p:nvSpPr>
-            <p:cNvPr name="TextBox 11" id="11"/>
-            <p:cNvSpPr txBox="true"/>
-            <p:nvPr/>
-          </p:nvSpPr>
-          <p:spPr>
-            <a:xfrm>
-              <a:off x="0" y="-66675"/>
-              <a:ext cx="812800" cy="879475"/>
-            </a:xfrm>
-            <a:prstGeom prst="rect">
-              <a:avLst/>
-            </a:prstGeom>
-          </p:spPr>
-          <p:txBody>
-            <a:bodyPr anchor="ctr" rtlCol="false" tIns="50800" lIns="50800" bIns="50800" rIns="50800"/>
-            <a:lstStyle/>
-            <a:p>
-              <a:pPr algn="ctr">
-                <a:lnSpc>
-                  <a:spcPts val="5599"/>
-                </a:lnSpc>
-                <a:spcBef>
-                  <a:spcPct val="0"/>
-                </a:spcBef>
-              </a:pPr>
-              <a:r>
-                <a:rPr lang="en-US" sz="3999">
-                  <a:solidFill>
-                    <a:srgbClr val="000000"/>
-                  </a:solidFill>
-                  <a:latin typeface="Nunito"/>
-                </a:rPr>
-                <a:t>0</a:t>
-              </a:r>
-            </a:p>
-          </p:txBody>
-        </p:sp>
-      </p:grpSp>
-      <p:grpSp>
-        <p:nvGrpSpPr>
-          <p:cNvPr name="Group 12" id="12"/>
-          <p:cNvGrpSpPr/>
+        </p:nvSpPr>
+        <p:spPr>
+          <a:xfrm>
+            <a:off x="7502615" y="4390079"/>
+            <a:ext cx="3086099" cy="3339253"/>
+          </a:xfrm>
+          <a:prstGeom prst="rect">
+            <a:avLst/>
+          </a:prstGeom>
+        </p:spPr>
+        <p:txBody>
+          <a:bodyPr lIns="50800" tIns="50800" rIns="50800" bIns="50800" rtlCol="0" anchor="ctr"/>
+          <a:lstStyle/>
+          <a:p>
+            <a:pPr algn="ctr">
+              <a:lnSpc>
+                <a:spcPts val="5599"/>
+              </a:lnSpc>
+              <a:spcBef>
+                <a:spcPct val="0"/>
+              </a:spcBef>
+            </a:pPr>
+            <a:r>
+              <a:rPr lang="en-US" sz="3999" dirty="0">
+                <a:solidFill>
+                  <a:srgbClr val="000000"/>
+                </a:solidFill>
+                <a:latin typeface="Nunito"/>
+              </a:rPr>
+              <a:t>0</a:t>
+            </a:r>
+          </a:p>
+        </p:txBody>
+      </p:sp>
+      <p:sp>
+        <p:nvSpPr>
+          <p:cNvPr id="14" name="TextBox 14"/>
+          <p:cNvSpPr txBox="1"/>
           <p:nvPr/>
-        </p:nvGrpSpPr>
-        <p:grpSpPr>
-          <a:xfrm rot="0">
-            <a:off x="12708078" y="5588614"/>
-            <a:ext cx="5450041" cy="1033888"/>
-            <a:chOff x="0" y="0"/>
-            <a:chExt cx="1435402" cy="272300"/>
-          </a:xfrm>
-        </p:grpSpPr>
-        <p:sp>
-          <p:nvSpPr>
-            <p:cNvPr name="Freeform 13" id="13"/>
-            <p:cNvSpPr/>
-            <p:nvPr/>
-          </p:nvSpPr>
-          <p:spPr>
-            <a:xfrm flipH="false" flipV="false" rot="0">
-              <a:off x="0" y="0"/>
-              <a:ext cx="1435402" cy="272300"/>
-            </a:xfrm>
-            <a:custGeom>
-              <a:avLst/>
-              <a:gdLst/>
-              <a:ahLst/>
-              <a:cxnLst/>
-              <a:rect r="r" b="b" t="t" l="l"/>
-              <a:pathLst>
-                <a:path h="272300" w="1435402">
-                  <a:moveTo>
-                    <a:pt x="0" y="0"/>
-                  </a:moveTo>
-                  <a:lnTo>
-                    <a:pt x="1435402" y="0"/>
-                  </a:lnTo>
-                  <a:lnTo>
-                    <a:pt x="1435402" y="272300"/>
-                  </a:lnTo>
-                  <a:lnTo>
-                    <a:pt x="0" y="272300"/>
-                  </a:lnTo>
-                  <a:close/>
-                </a:path>
-              </a:pathLst>
-            </a:custGeom>
-            <a:solidFill>
-              <a:srgbClr val="FACAAC"/>
-            </a:solidFill>
-            <a:ln>
-              <a:noFill/>
-            </a:ln>
-          </p:spPr>
-        </p:sp>
-        <p:sp>
-          <p:nvSpPr>
-            <p:cNvPr name="TextBox 14" id="14"/>
-            <p:cNvSpPr txBox="true"/>
-            <p:nvPr/>
-          </p:nvSpPr>
-          <p:spPr>
-            <a:xfrm>
-              <a:off x="0" y="-66675"/>
-              <a:ext cx="812800" cy="879475"/>
-            </a:xfrm>
-            <a:prstGeom prst="rect">
-              <a:avLst/>
-            </a:prstGeom>
-          </p:spPr>
-          <p:txBody>
-            <a:bodyPr anchor="ctr" rtlCol="false" tIns="50800" lIns="50800" bIns="50800" rIns="50800"/>
-            <a:lstStyle/>
-            <a:p>
-              <a:pPr algn="ctr">
-                <a:lnSpc>
-                  <a:spcPts val="5599"/>
-                </a:lnSpc>
-                <a:spcBef>
-                  <a:spcPct val="0"/>
-                </a:spcBef>
-              </a:pPr>
-              <a:r>
-                <a:rPr lang="en-US" sz="3999">
-                  <a:solidFill>
-                    <a:srgbClr val="000000"/>
-                  </a:solidFill>
-                  <a:latin typeface="Nunito"/>
-                </a:rPr>
-                <a:t>1</a:t>
-              </a:r>
-            </a:p>
-          </p:txBody>
-        </p:sp>
-      </p:grpSp>
-      <p:grpSp>
-        <p:nvGrpSpPr>
-          <p:cNvPr name="Group 15" id="15"/>
-          <p:cNvGrpSpPr/>
+        </p:nvSpPr>
+        <p:spPr>
+          <a:xfrm>
+            <a:off x="13070533" y="4318390"/>
+            <a:ext cx="3086099" cy="3339253"/>
+          </a:xfrm>
+          <a:prstGeom prst="rect">
+            <a:avLst/>
+          </a:prstGeom>
+        </p:spPr>
+        <p:txBody>
+          <a:bodyPr lIns="50800" tIns="50800" rIns="50800" bIns="50800" rtlCol="0" anchor="ctr"/>
+          <a:lstStyle/>
+          <a:p>
+            <a:pPr algn="ctr">
+              <a:lnSpc>
+                <a:spcPts val="5599"/>
+              </a:lnSpc>
+              <a:spcBef>
+                <a:spcPct val="0"/>
+              </a:spcBef>
+            </a:pPr>
+            <a:r>
+              <a:rPr lang="en-US" sz="3999" dirty="0">
+                <a:solidFill>
+                  <a:srgbClr val="000000"/>
+                </a:solidFill>
+                <a:latin typeface="Nunito"/>
+              </a:rPr>
+              <a:t>1</a:t>
+            </a:r>
+          </a:p>
+        </p:txBody>
+      </p:sp>
+      <p:sp>
+        <p:nvSpPr>
+          <p:cNvPr id="17" name="TextBox 17"/>
+          <p:cNvSpPr txBox="1"/>
           <p:nvPr/>
-        </p:nvGrpSpPr>
-        <p:grpSpPr>
-          <a:xfrm rot="0">
-            <a:off x="7258037" y="6698701"/>
-            <a:ext cx="5450041" cy="1033888"/>
-            <a:chOff x="0" y="0"/>
-            <a:chExt cx="1435402" cy="272300"/>
-          </a:xfrm>
-        </p:grpSpPr>
-        <p:sp>
-          <p:nvSpPr>
-            <p:cNvPr name="Freeform 16" id="16"/>
-            <p:cNvSpPr/>
-            <p:nvPr/>
-          </p:nvSpPr>
-          <p:spPr>
-            <a:xfrm flipH="false" flipV="false" rot="0">
-              <a:off x="0" y="0"/>
-              <a:ext cx="1435402" cy="272300"/>
-            </a:xfrm>
-            <a:custGeom>
-              <a:avLst/>
-              <a:gdLst/>
-              <a:ahLst/>
-              <a:cxnLst/>
-              <a:rect r="r" b="b" t="t" l="l"/>
-              <a:pathLst>
-                <a:path h="272300" w="1435402">
-                  <a:moveTo>
-                    <a:pt x="0" y="0"/>
-                  </a:moveTo>
-                  <a:lnTo>
-                    <a:pt x="1435402" y="0"/>
-                  </a:lnTo>
-                  <a:lnTo>
-                    <a:pt x="1435402" y="272300"/>
-                  </a:lnTo>
-                  <a:lnTo>
-                    <a:pt x="0" y="272300"/>
-                  </a:lnTo>
-                  <a:close/>
-                </a:path>
-              </a:pathLst>
-            </a:custGeom>
-            <a:solidFill>
-              <a:srgbClr val="FACAAC"/>
-            </a:solidFill>
-            <a:ln>
-              <a:noFill/>
-            </a:ln>
-          </p:spPr>
-        </p:sp>
-        <p:sp>
-          <p:nvSpPr>
-            <p:cNvPr name="TextBox 17" id="17"/>
-            <p:cNvSpPr txBox="true"/>
-            <p:nvPr/>
-          </p:nvSpPr>
-          <p:spPr>
-            <a:xfrm>
-              <a:off x="0" y="-57150"/>
-              <a:ext cx="812800" cy="869950"/>
-            </a:xfrm>
-            <a:prstGeom prst="rect">
-              <a:avLst/>
-            </a:prstGeom>
-          </p:spPr>
-          <p:txBody>
-            <a:bodyPr anchor="ctr" rtlCol="false" tIns="50800" lIns="50800" bIns="50800" rIns="50800"/>
-            <a:lstStyle/>
-            <a:p>
-              <a:pPr algn="ctr">
-                <a:lnSpc>
-                  <a:spcPts val="4899"/>
-                </a:lnSpc>
-                <a:spcBef>
-                  <a:spcPct val="0"/>
-                </a:spcBef>
-              </a:pPr>
-              <a:r>
-                <a:rPr lang="en-US" sz="3499">
-                  <a:solidFill>
-                    <a:srgbClr val="000000"/>
-                  </a:solidFill>
-                  <a:latin typeface="Nunito"/>
-                </a:rPr>
-                <a:t> 6,362,604</a:t>
-              </a:r>
-            </a:p>
-          </p:txBody>
-        </p:sp>
-      </p:grpSp>
-      <p:grpSp>
-        <p:nvGrpSpPr>
-          <p:cNvPr name="Group 18" id="18"/>
-          <p:cNvGrpSpPr/>
+        </p:nvSpPr>
+        <p:spPr>
+          <a:xfrm>
+            <a:off x="7943787" y="5645121"/>
+            <a:ext cx="3086099" cy="3303088"/>
+          </a:xfrm>
+          <a:prstGeom prst="rect">
+            <a:avLst/>
+          </a:prstGeom>
+        </p:spPr>
+        <p:txBody>
+          <a:bodyPr lIns="50800" tIns="50800" rIns="50800" bIns="50800" rtlCol="0" anchor="ctr"/>
+          <a:lstStyle/>
+          <a:p>
+            <a:pPr algn="ctr">
+              <a:lnSpc>
+                <a:spcPts val="4899"/>
+              </a:lnSpc>
+              <a:spcBef>
+                <a:spcPct val="0"/>
+              </a:spcBef>
+            </a:pPr>
+            <a:r>
+              <a:rPr lang="en-US" sz="3499" dirty="0">
+                <a:solidFill>
+                  <a:srgbClr val="000000"/>
+                </a:solidFill>
+                <a:latin typeface="Nunito"/>
+              </a:rPr>
+              <a:t> 6,362,604</a:t>
+            </a:r>
+          </a:p>
+        </p:txBody>
+      </p:sp>
+      <p:sp>
+        <p:nvSpPr>
+          <p:cNvPr id="20" name="TextBox 20"/>
+          <p:cNvSpPr txBox="1"/>
           <p:nvPr/>
-        </p:nvGrpSpPr>
-        <p:grpSpPr>
-          <a:xfrm rot="0">
-            <a:off x="7258037" y="7694489"/>
-            <a:ext cx="5450041" cy="1033888"/>
-            <a:chOff x="0" y="0"/>
-            <a:chExt cx="1435402" cy="272300"/>
-          </a:xfrm>
-        </p:grpSpPr>
-        <p:sp>
-          <p:nvSpPr>
-            <p:cNvPr name="Freeform 19" id="19"/>
-            <p:cNvSpPr/>
-            <p:nvPr/>
-          </p:nvSpPr>
-          <p:spPr>
-            <a:xfrm flipH="false" flipV="false" rot="0">
-              <a:off x="0" y="0"/>
-              <a:ext cx="1435402" cy="272300"/>
-            </a:xfrm>
-            <a:custGeom>
-              <a:avLst/>
-              <a:gdLst/>
-              <a:ahLst/>
-              <a:cxnLst/>
-              <a:rect r="r" b="b" t="t" l="l"/>
-              <a:pathLst>
-                <a:path h="272300" w="1435402">
-                  <a:moveTo>
-                    <a:pt x="0" y="0"/>
-                  </a:moveTo>
-                  <a:lnTo>
-                    <a:pt x="1435402" y="0"/>
-                  </a:lnTo>
-                  <a:lnTo>
-                    <a:pt x="1435402" y="272300"/>
-                  </a:lnTo>
-                  <a:lnTo>
-                    <a:pt x="0" y="272300"/>
-                  </a:lnTo>
-                  <a:close/>
-                </a:path>
-              </a:pathLst>
-            </a:custGeom>
-            <a:solidFill>
-              <a:srgbClr val="FACAAC"/>
-            </a:solidFill>
-            <a:ln>
-              <a:noFill/>
-            </a:ln>
-          </p:spPr>
-        </p:sp>
-        <p:sp>
-          <p:nvSpPr>
-            <p:cNvPr name="TextBox 20" id="20"/>
-            <p:cNvSpPr txBox="true"/>
-            <p:nvPr/>
-          </p:nvSpPr>
-          <p:spPr>
-            <a:xfrm>
-              <a:off x="0" y="-57150"/>
-              <a:ext cx="812800" cy="869950"/>
-            </a:xfrm>
-            <a:prstGeom prst="rect">
-              <a:avLst/>
-            </a:prstGeom>
-          </p:spPr>
-          <p:txBody>
-            <a:bodyPr anchor="ctr" rtlCol="false" tIns="50800" lIns="50800" bIns="50800" rIns="50800"/>
-            <a:lstStyle/>
-            <a:p>
-              <a:pPr algn="ctr">
-                <a:lnSpc>
-                  <a:spcPts val="4899"/>
-                </a:lnSpc>
-                <a:spcBef>
-                  <a:spcPct val="0"/>
-                </a:spcBef>
-              </a:pPr>
-              <a:r>
-                <a:rPr lang="en-US" sz="3499">
-                  <a:solidFill>
-                    <a:srgbClr val="000000"/>
-                  </a:solidFill>
-                  <a:latin typeface="Nunito"/>
-                </a:rPr>
-                <a:t> 6,354,407</a:t>
-              </a:r>
-            </a:p>
-          </p:txBody>
-        </p:sp>
-      </p:grpSp>
-      <p:grpSp>
-        <p:nvGrpSpPr>
-          <p:cNvPr name="Group 21" id="21"/>
-          <p:cNvGrpSpPr/>
+        </p:nvSpPr>
+        <p:spPr>
+          <a:xfrm>
+            <a:off x="7748565" y="7296665"/>
+            <a:ext cx="3604950" cy="2241982"/>
+          </a:xfrm>
+          <a:prstGeom prst="rect">
+            <a:avLst/>
+          </a:prstGeom>
+        </p:spPr>
+        <p:txBody>
+          <a:bodyPr lIns="50800" tIns="50800" rIns="50800" bIns="50800" rtlCol="0" anchor="ctr"/>
+          <a:lstStyle/>
+          <a:p>
+            <a:pPr algn="ctr">
+              <a:lnSpc>
+                <a:spcPts val="4899"/>
+              </a:lnSpc>
+              <a:spcBef>
+                <a:spcPct val="0"/>
+              </a:spcBef>
+            </a:pPr>
+            <a:r>
+              <a:rPr lang="en-US" sz="3499" dirty="0">
+                <a:solidFill>
+                  <a:srgbClr val="000000"/>
+                </a:solidFill>
+                <a:latin typeface="Nunito"/>
+              </a:rPr>
+              <a:t> 6,354,407</a:t>
+            </a:r>
+          </a:p>
+        </p:txBody>
+      </p:sp>
+      <p:sp>
+        <p:nvSpPr>
+          <p:cNvPr id="23" name="TextBox 23"/>
+          <p:cNvSpPr txBox="1"/>
           <p:nvPr/>
-        </p:nvGrpSpPr>
-        <p:grpSpPr>
-          <a:xfrm rot="0">
-            <a:off x="12708078" y="6698701"/>
-            <a:ext cx="5450041" cy="1033888"/>
-            <a:chOff x="0" y="0"/>
-            <a:chExt cx="1435402" cy="272300"/>
-          </a:xfrm>
-        </p:grpSpPr>
-        <p:sp>
-          <p:nvSpPr>
-            <p:cNvPr name="Freeform 22" id="22"/>
-            <p:cNvSpPr/>
-            <p:nvPr/>
-          </p:nvSpPr>
-          <p:spPr>
-            <a:xfrm flipH="false" flipV="false" rot="0">
-              <a:off x="0" y="0"/>
-              <a:ext cx="1435402" cy="272300"/>
-            </a:xfrm>
-            <a:custGeom>
-              <a:avLst/>
-              <a:gdLst/>
-              <a:ahLst/>
-              <a:cxnLst/>
-              <a:rect r="r" b="b" t="t" l="l"/>
-              <a:pathLst>
-                <a:path h="272300" w="1435402">
-                  <a:moveTo>
-                    <a:pt x="0" y="0"/>
-                  </a:moveTo>
-                  <a:lnTo>
-                    <a:pt x="1435402" y="0"/>
-                  </a:lnTo>
-                  <a:lnTo>
-                    <a:pt x="1435402" y="272300"/>
-                  </a:lnTo>
-                  <a:lnTo>
-                    <a:pt x="0" y="272300"/>
-                  </a:lnTo>
-                  <a:close/>
-                </a:path>
-              </a:pathLst>
-            </a:custGeom>
-            <a:solidFill>
-              <a:srgbClr val="FACAAC"/>
-            </a:solidFill>
-            <a:ln>
-              <a:noFill/>
-            </a:ln>
-          </p:spPr>
-        </p:sp>
-        <p:sp>
-          <p:nvSpPr>
-            <p:cNvPr name="TextBox 23" id="23"/>
-            <p:cNvSpPr txBox="true"/>
-            <p:nvPr/>
-          </p:nvSpPr>
-          <p:spPr>
-            <a:xfrm>
-              <a:off x="0" y="-57150"/>
-              <a:ext cx="812800" cy="869950"/>
-            </a:xfrm>
-            <a:prstGeom prst="rect">
-              <a:avLst/>
-            </a:prstGeom>
-          </p:spPr>
-          <p:txBody>
-            <a:bodyPr anchor="ctr" rtlCol="false" tIns="50800" lIns="50800" bIns="50800" rIns="50800"/>
-            <a:lstStyle/>
-            <a:p>
-              <a:pPr algn="ctr">
-                <a:lnSpc>
-                  <a:spcPts val="4899"/>
-                </a:lnSpc>
-                <a:spcBef>
-                  <a:spcPct val="0"/>
-                </a:spcBef>
-              </a:pPr>
-              <a:r>
-                <a:rPr lang="en-US" sz="3499">
-                  <a:solidFill>
-                    <a:srgbClr val="000000"/>
-                  </a:solidFill>
-                  <a:latin typeface="Nunito"/>
-                </a:rPr>
-                <a:t> 16</a:t>
-              </a:r>
-            </a:p>
-          </p:txBody>
-        </p:sp>
-      </p:grpSp>
-      <p:grpSp>
-        <p:nvGrpSpPr>
-          <p:cNvPr name="Group 24" id="24"/>
-          <p:cNvGrpSpPr/>
+        </p:nvSpPr>
+        <p:spPr>
+          <a:xfrm>
+            <a:off x="13070533" y="5707382"/>
+            <a:ext cx="3086099" cy="3303088"/>
+          </a:xfrm>
+          <a:prstGeom prst="rect">
+            <a:avLst/>
+          </a:prstGeom>
+        </p:spPr>
+        <p:txBody>
+          <a:bodyPr lIns="50800" tIns="50800" rIns="50800" bIns="50800" rtlCol="0" anchor="ctr"/>
+          <a:lstStyle/>
+          <a:p>
+            <a:pPr algn="ctr">
+              <a:lnSpc>
+                <a:spcPts val="4899"/>
+              </a:lnSpc>
+              <a:spcBef>
+                <a:spcPct val="0"/>
+              </a:spcBef>
+            </a:pPr>
+            <a:r>
+              <a:rPr lang="en-US" sz="3499" dirty="0">
+                <a:solidFill>
+                  <a:srgbClr val="000000"/>
+                </a:solidFill>
+                <a:latin typeface="Nunito"/>
+              </a:rPr>
+              <a:t> 16</a:t>
+            </a:r>
+          </a:p>
+        </p:txBody>
+      </p:sp>
+      <p:sp>
+        <p:nvSpPr>
+          <p:cNvPr id="26" name="TextBox 26"/>
+          <p:cNvSpPr txBox="1"/>
           <p:nvPr/>
-        </p:nvGrpSpPr>
-        <p:grpSpPr>
-          <a:xfrm rot="0">
-            <a:off x="12682095" y="7694489"/>
-            <a:ext cx="5450041" cy="1033888"/>
-            <a:chOff x="0" y="0"/>
-            <a:chExt cx="1435402" cy="272300"/>
-          </a:xfrm>
-        </p:grpSpPr>
-        <p:sp>
-          <p:nvSpPr>
-            <p:cNvPr name="Freeform 25" id="25"/>
-            <p:cNvSpPr/>
-            <p:nvPr/>
-          </p:nvSpPr>
-          <p:spPr>
-            <a:xfrm flipH="false" flipV="false" rot="0">
-              <a:off x="0" y="0"/>
-              <a:ext cx="1435402" cy="272300"/>
-            </a:xfrm>
-            <a:custGeom>
-              <a:avLst/>
-              <a:gdLst/>
-              <a:ahLst/>
-              <a:cxnLst/>
-              <a:rect r="r" b="b" t="t" l="l"/>
-              <a:pathLst>
-                <a:path h="272300" w="1435402">
-                  <a:moveTo>
-                    <a:pt x="0" y="0"/>
-                  </a:moveTo>
-                  <a:lnTo>
-                    <a:pt x="1435402" y="0"/>
-                  </a:lnTo>
-                  <a:lnTo>
-                    <a:pt x="1435402" y="272300"/>
-                  </a:lnTo>
-                  <a:lnTo>
-                    <a:pt x="0" y="272300"/>
-                  </a:lnTo>
-                  <a:close/>
-                </a:path>
-              </a:pathLst>
-            </a:custGeom>
-            <a:solidFill>
-              <a:srgbClr val="FACAAC"/>
-            </a:solidFill>
-            <a:ln>
-              <a:noFill/>
-            </a:ln>
-          </p:spPr>
-        </p:sp>
-        <p:sp>
-          <p:nvSpPr>
-            <p:cNvPr name="TextBox 26" id="26"/>
-            <p:cNvSpPr txBox="true"/>
-            <p:nvPr/>
-          </p:nvSpPr>
-          <p:spPr>
-            <a:xfrm>
-              <a:off x="0" y="-57150"/>
-              <a:ext cx="812800" cy="869950"/>
-            </a:xfrm>
-            <a:prstGeom prst="rect">
-              <a:avLst/>
-            </a:prstGeom>
-          </p:spPr>
-          <p:txBody>
-            <a:bodyPr anchor="ctr" rtlCol="false" tIns="50800" lIns="50800" bIns="50800" rIns="50800"/>
-            <a:lstStyle/>
-            <a:p>
-              <a:pPr algn="ctr">
-                <a:lnSpc>
-                  <a:spcPts val="4899"/>
-                </a:lnSpc>
-                <a:spcBef>
-                  <a:spcPct val="0"/>
-                </a:spcBef>
-              </a:pPr>
-              <a:r>
-                <a:rPr lang="en-US" sz="3499">
-                  <a:solidFill>
-                    <a:srgbClr val="000000"/>
-                  </a:solidFill>
-                  <a:latin typeface="Nunito"/>
-                </a:rPr>
-                <a:t>8,213</a:t>
-              </a:r>
-            </a:p>
-          </p:txBody>
-        </p:sp>
-      </p:grpSp>
-      <p:sp>
-        <p:nvSpPr>
-          <p:cNvPr name="Freeform 27" id="27"/>
+        </p:nvSpPr>
+        <p:spPr>
+          <a:xfrm>
+            <a:off x="13245816" y="6785872"/>
+            <a:ext cx="3086099" cy="3303088"/>
+          </a:xfrm>
+          <a:prstGeom prst="rect">
+            <a:avLst/>
+          </a:prstGeom>
+        </p:spPr>
+        <p:txBody>
+          <a:bodyPr lIns="50800" tIns="50800" rIns="50800" bIns="50800" rtlCol="0" anchor="ctr"/>
+          <a:lstStyle/>
+          <a:p>
+            <a:pPr algn="ctr">
+              <a:lnSpc>
+                <a:spcPts val="4899"/>
+              </a:lnSpc>
+              <a:spcBef>
+                <a:spcPct val="0"/>
+              </a:spcBef>
+            </a:pPr>
+            <a:r>
+              <a:rPr lang="en-US" sz="3499" dirty="0">
+                <a:solidFill>
+                  <a:srgbClr val="000000"/>
+                </a:solidFill>
+                <a:latin typeface="Nunito"/>
+              </a:rPr>
+              <a:t>8,213</a:t>
+            </a:r>
+          </a:p>
+        </p:txBody>
+      </p:sp>
+      <p:sp>
+        <p:nvSpPr>
+          <p:cNvPr id="27" name="Freeform 27"/>
           <p:cNvSpPr/>
           <p:nvPr/>
         </p:nvSpPr>
         <p:spPr>
-          <a:xfrm flipH="true" flipV="false" rot="0">
+          <a:xfrm flipH="1">
             <a:off x="13876651" y="9172733"/>
             <a:ext cx="2198134" cy="1374833"/>
           </a:xfrm>
@@ -4874,9 +4392,9 @@
             <a:gdLst/>
             <a:ahLst/>
             <a:cxnLst/>
-            <a:rect r="r" b="b" t="t" l="l"/>
+            <a:rect l="l" t="t" r="r" b="b"/>
             <a:pathLst>
-              <a:path h="1374833" w="2198134">
+              <a:path w="2198134" h="1374833">
                 <a:moveTo>
                   <a:pt x="2198134" y="0"/>
                 </a:moveTo>
@@ -4905,33 +4423,33 @@
               </a:extLst>
             </a:blip>
             <a:stretch>
-              <a:fillRect l="0" t="0" r="0" b="0"/>
+              <a:fillRect/>
             </a:stretch>
           </a:blipFill>
         </p:spPr>
       </p:sp>
       <p:grpSp>
         <p:nvGrpSpPr>
-          <p:cNvPr name="Group 28" id="28"/>
+          <p:cNvPr id="28" name="Group 28"/>
           <p:cNvGrpSpPr/>
           <p:nvPr/>
         </p:nvGrpSpPr>
         <p:grpSpPr>
-          <a:xfrm rot="0">
-            <a:off x="768926" y="716972"/>
-            <a:ext cx="7097253" cy="2556158"/>
-            <a:chOff x="0" y="0"/>
-            <a:chExt cx="1869235" cy="673227"/>
+          <a:xfrm>
+            <a:off x="768926" y="463815"/>
+            <a:ext cx="7097257" cy="3339256"/>
+            <a:chOff x="0" y="-66675"/>
+            <a:chExt cx="1869236" cy="879475"/>
           </a:xfrm>
         </p:grpSpPr>
         <p:sp>
           <p:nvSpPr>
-            <p:cNvPr name="Freeform 29" id="29"/>
+            <p:cNvPr id="29" name="Freeform 29"/>
             <p:cNvSpPr/>
             <p:nvPr/>
           </p:nvSpPr>
           <p:spPr>
-            <a:xfrm flipH="false" flipV="false" rot="0">
+            <a:xfrm>
               <a:off x="0" y="0"/>
               <a:ext cx="1869236" cy="673227"/>
             </a:xfrm>
@@ -4940,9 +4458,9 @@
               <a:gdLst/>
               <a:ahLst/>
               <a:cxnLst/>
-              <a:rect r="r" b="b" t="t" l="l"/>
+              <a:rect l="l" t="t" r="r" b="b"/>
               <a:pathLst>
-                <a:path h="673227" w="1869236">
+                <a:path w="1869236" h="673227">
                   <a:moveTo>
                     <a:pt x="55632" y="0"/>
                   </a:moveTo>
@@ -4999,21 +4517,21 @@
         </p:sp>
         <p:sp>
           <p:nvSpPr>
-            <p:cNvPr name="TextBox 30" id="30"/>
-            <p:cNvSpPr txBox="true"/>
+            <p:cNvPr id="30" name="TextBox 30"/>
+            <p:cNvSpPr txBox="1"/>
             <p:nvPr/>
           </p:nvSpPr>
           <p:spPr>
             <a:xfrm>
               <a:off x="0" y="-66675"/>
-              <a:ext cx="812800" cy="879475"/>
+              <a:ext cx="1435401" cy="879475"/>
             </a:xfrm>
             <a:prstGeom prst="rect">
               <a:avLst/>
             </a:prstGeom>
           </p:spPr>
           <p:txBody>
-            <a:bodyPr anchor="ctr" rtlCol="false" tIns="50800" lIns="50800" bIns="50800" rIns="50800"/>
+            <a:bodyPr lIns="50800" tIns="50800" rIns="50800" bIns="50800" rtlCol="0" anchor="ctr"/>
             <a:lstStyle/>
             <a:p>
               <a:pPr algn="ctr">
@@ -5022,7 +4540,7 @@
                 </a:lnSpc>
               </a:pPr>
               <a:r>
-                <a:rPr lang="en-US" sz="3248">
+                <a:rPr lang="en-US" sz="3248" dirty="0">
                   <a:solidFill>
                     <a:srgbClr val="000000"/>
                   </a:solidFill>
@@ -5031,7 +4549,7 @@
                 <a:t>Type : </a:t>
               </a:r>
               <a:r>
-                <a:rPr lang="en-US" sz="3248">
+                <a:rPr lang="en-US" sz="3248" dirty="0">
                   <a:solidFill>
                     <a:srgbClr val="000000"/>
                   </a:solidFill>
@@ -5047,7 +4565,7 @@
                 </a:lnSpc>
               </a:pPr>
               <a:r>
-                <a:rPr lang="en-US" sz="3248">
+                <a:rPr lang="en-US" sz="3248" dirty="0">
                   <a:solidFill>
                     <a:srgbClr val="000000"/>
                   </a:solidFill>
@@ -5063,7 +4581,7 @@
                 </a:lnSpc>
               </a:pPr>
               <a:r>
-                <a:rPr lang="en-US" sz="3248">
+                <a:rPr lang="en-US" sz="3248" dirty="0">
                   <a:solidFill>
                     <a:srgbClr val="000000"/>
                   </a:solidFill>
@@ -5078,19 +4596,25 @@
                   <a:spcPts val="3428"/>
                 </a:lnSpc>
               </a:pPr>
+              <a:endParaRPr lang="en-US" sz="3248" dirty="0">
+                <a:solidFill>
+                  <a:srgbClr val="000000"/>
+                </a:solidFill>
+                <a:latin typeface="Nunito"/>
+              </a:endParaRPr>
             </a:p>
           </p:txBody>
         </p:sp>
       </p:grpSp>
       <p:grpSp>
         <p:nvGrpSpPr>
-          <p:cNvPr name="Group 31" id="31"/>
+          <p:cNvPr id="31" name="Group 31"/>
           <p:cNvGrpSpPr/>
           <p:nvPr/>
         </p:nvGrpSpPr>
         <p:grpSpPr>
-          <a:xfrm rot="0">
-            <a:off x="14325218" y="2838709"/>
+          <a:xfrm>
+            <a:off x="14788866" y="2422493"/>
             <a:ext cx="3499134" cy="2512610"/>
             <a:chOff x="0" y="0"/>
             <a:chExt cx="921583" cy="661757"/>
@@ -5098,12 +4622,12 @@
         </p:grpSpPr>
         <p:sp>
           <p:nvSpPr>
-            <p:cNvPr name="Freeform 32" id="32"/>
+            <p:cNvPr id="32" name="Freeform 32"/>
             <p:cNvSpPr/>
             <p:nvPr/>
           </p:nvSpPr>
           <p:spPr>
-            <a:xfrm flipH="false" flipV="false" rot="0">
+            <a:xfrm>
               <a:off x="0" y="0"/>
               <a:ext cx="921583" cy="661757"/>
             </a:xfrm>
@@ -5112,9 +4636,9 @@
               <a:gdLst/>
               <a:ahLst/>
               <a:cxnLst/>
-              <a:rect r="r" b="b" t="t" l="l"/>
+              <a:rect l="l" t="t" r="r" b="b"/>
               <a:pathLst>
-                <a:path h="661757" w="921583">
+                <a:path w="921583" h="661757">
                   <a:moveTo>
                     <a:pt x="112839" y="0"/>
                   </a:moveTo>
@@ -5166,8 +4690,8 @@
         </p:sp>
         <p:sp>
           <p:nvSpPr>
-            <p:cNvPr name="TextBox 33" id="33"/>
-            <p:cNvSpPr txBox="true"/>
+            <p:cNvPr id="33" name="TextBox 33"/>
+            <p:cNvSpPr txBox="1"/>
             <p:nvPr/>
           </p:nvSpPr>
           <p:spPr>
@@ -5180,7 +4704,7 @@
             </a:prstGeom>
           </p:spPr>
           <p:txBody>
-            <a:bodyPr anchor="ctr" rtlCol="false" tIns="50800" lIns="50800" bIns="50800" rIns="50800"/>
+            <a:bodyPr lIns="50800" tIns="50800" rIns="50800" bIns="50800" rtlCol="0" anchor="ctr"/>
             <a:lstStyle/>
             <a:p>
               <a:pPr algn="ctr">
@@ -5189,7 +4713,7 @@
                 </a:lnSpc>
               </a:pPr>
               <a:r>
-                <a:rPr lang="en-US" sz="2948">
+                <a:rPr lang="en-US" sz="2948" dirty="0">
                   <a:solidFill>
                     <a:srgbClr val="000000"/>
                   </a:solidFill>
@@ -5205,7 +4729,7 @@
                 </a:lnSpc>
               </a:pPr>
               <a:r>
-                <a:rPr lang="en-US" sz="2948">
+                <a:rPr lang="en-US" sz="2948" dirty="0">
                   <a:solidFill>
                     <a:srgbClr val="000000"/>
                   </a:solidFill>
@@ -5226,13 +4750,14 @@
 </file>
 
 <file path=ppt/slides/slide4.xml><?xml version="1.0" encoding="utf-8"?>
-<p:sld xmlns:p="http://schemas.openxmlformats.org/presentationml/2006/main" xmlns:a="http://schemas.openxmlformats.org/drawingml/2006/main" xmlns:r="http://schemas.openxmlformats.org/officeDocument/2006/relationships">
+<p:sld xmlns:a="http://schemas.openxmlformats.org/drawingml/2006/main" xmlns:r="http://schemas.openxmlformats.org/officeDocument/2006/relationships" xmlns:p="http://schemas.openxmlformats.org/presentationml/2006/main">
   <p:cSld>
     <p:bg>
       <p:bgPr>
         <a:solidFill>
           <a:srgbClr val="FFE6BF"/>
         </a:solidFill>
+        <a:effectLst/>
       </p:bgPr>
     </p:bg>
     <p:spTree>
@@ -5251,12 +4776,12 @@
       </p:grpSpPr>
       <p:sp>
         <p:nvSpPr>
-          <p:cNvPr name="Freeform 2" id="2"/>
+          <p:cNvPr id="2" name="Freeform 2"/>
           <p:cNvSpPr/>
           <p:nvPr/>
         </p:nvSpPr>
         <p:spPr>
-          <a:xfrm flipH="false" flipV="false" rot="0">
+          <a:xfrm>
             <a:off x="10405885" y="872015"/>
             <a:ext cx="7882115" cy="7831750"/>
           </a:xfrm>
@@ -5265,9 +4790,9 @@
             <a:gdLst/>
             <a:ahLst/>
             <a:cxnLst/>
-            <a:rect r="r" b="b" t="t" l="l"/>
+            <a:rect l="l" t="t" r="r" b="b"/>
             <a:pathLst>
-              <a:path h="7831750" w="7882115">
+              <a:path w="7882115" h="7831750">
                 <a:moveTo>
                   <a:pt x="0" y="0"/>
                 </a:moveTo>
@@ -5290,33 +4815,33 @@
           <a:blipFill>
             <a:blip r:embed="rId2"/>
             <a:stretch>
-              <a:fillRect l="0" t="0" r="0" b="0"/>
+              <a:fillRect/>
             </a:stretch>
           </a:blipFill>
         </p:spPr>
       </p:sp>
       <p:grpSp>
         <p:nvGrpSpPr>
-          <p:cNvPr name="Group 3" id="3"/>
+          <p:cNvPr id="3" name="Group 3"/>
           <p:cNvGrpSpPr/>
           <p:nvPr/>
         </p:nvGrpSpPr>
         <p:grpSpPr>
-          <a:xfrm rot="0">
-            <a:off x="-889063" y="2327549"/>
-            <a:ext cx="11294949" cy="6930751"/>
+          <a:xfrm>
+            <a:off x="0" y="1891535"/>
+            <a:ext cx="10405886" cy="6930751"/>
             <a:chOff x="0" y="0"/>
             <a:chExt cx="2974801" cy="1825383"/>
           </a:xfrm>
         </p:grpSpPr>
         <p:sp>
           <p:nvSpPr>
-            <p:cNvPr name="Freeform 4" id="4"/>
+            <p:cNvPr id="4" name="Freeform 4"/>
             <p:cNvSpPr/>
             <p:nvPr/>
           </p:nvSpPr>
           <p:spPr>
-            <a:xfrm flipH="false" flipV="false" rot="0">
+            <a:xfrm>
               <a:off x="0" y="0"/>
               <a:ext cx="2974801" cy="1825383"/>
             </a:xfrm>
@@ -5325,9 +4850,9 @@
               <a:gdLst/>
               <a:ahLst/>
               <a:cxnLst/>
-              <a:rect r="r" b="b" t="t" l="l"/>
+              <a:rect l="l" t="t" r="r" b="b"/>
               <a:pathLst>
-                <a:path h="1825383" w="2974801">
+                <a:path w="2974801" h="1825383">
                   <a:moveTo>
                     <a:pt x="34957" y="0"/>
                   </a:moveTo>
@@ -5394,8 +4919,8 @@
         </p:sp>
         <p:sp>
           <p:nvSpPr>
-            <p:cNvPr name="TextBox 5" id="5"/>
-            <p:cNvSpPr txBox="true"/>
+            <p:cNvPr id="5" name="TextBox 5"/>
+            <p:cNvSpPr txBox="1"/>
             <p:nvPr/>
           </p:nvSpPr>
           <p:spPr>
@@ -5408,7 +4933,7 @@
             </a:prstGeom>
           </p:spPr>
           <p:txBody>
-            <a:bodyPr anchor="ctr" rtlCol="false" tIns="50800" lIns="50800" bIns="50800" rIns="50800"/>
+            <a:bodyPr lIns="50800" tIns="50800" rIns="50800" bIns="50800" rtlCol="0" anchor="ctr"/>
             <a:lstStyle/>
             <a:p>
               <a:pPr algn="ctr">
@@ -5416,27 +4941,28 @@
                   <a:spcPts val="2448"/>
                 </a:lnSpc>
               </a:pPr>
+              <a:endParaRPr/>
             </a:p>
           </p:txBody>
         </p:sp>
       </p:grpSp>
       <p:sp>
         <p:nvSpPr>
-          <p:cNvPr name="TextBox 6" id="6"/>
-          <p:cNvSpPr txBox="true"/>
+          <p:cNvPr id="6" name="TextBox 6"/>
+          <p:cNvSpPr txBox="1"/>
           <p:nvPr/>
         </p:nvSpPr>
         <p:spPr>
-          <a:xfrm rot="0">
-            <a:off x="12673051" y="8940807"/>
-            <a:ext cx="4789438" cy="969979"/>
+          <a:xfrm>
+            <a:off x="11658600" y="8940807"/>
+            <a:ext cx="5803889" cy="969979"/>
           </a:xfrm>
           <a:prstGeom prst="rect">
             <a:avLst/>
           </a:prstGeom>
         </p:spPr>
         <p:txBody>
-          <a:bodyPr anchor="t" rtlCol="false" tIns="0" lIns="0" bIns="0" rIns="0">
+          <a:bodyPr wrap="square" lIns="0" tIns="0" rIns="0" bIns="0" rtlCol="0" anchor="t">
             <a:spAutoFit/>
           </a:bodyPr>
           <a:lstStyle/>
@@ -5447,7 +4973,7 @@
               </a:lnSpc>
             </a:pPr>
             <a:r>
-              <a:rPr lang="en-US" sz="5654">
+              <a:rPr lang="en-US" sz="5654" dirty="0">
                 <a:solidFill>
                   <a:srgbClr val="000000"/>
                 </a:solidFill>
@@ -5460,21 +4986,21 @@
       </p:sp>
       <p:sp>
         <p:nvSpPr>
-          <p:cNvPr name="TextBox 7" id="7"/>
-          <p:cNvSpPr txBox="true"/>
+          <p:cNvPr id="7" name="TextBox 7"/>
+          <p:cNvSpPr txBox="1"/>
           <p:nvPr/>
         </p:nvSpPr>
         <p:spPr>
-          <a:xfrm rot="0">
-            <a:off x="1028700" y="3172474"/>
-            <a:ext cx="2902644" cy="1329665"/>
+          <a:xfrm>
+            <a:off x="762000" y="3458871"/>
+            <a:ext cx="2902644" cy="1369606"/>
           </a:xfrm>
           <a:prstGeom prst="rect">
             <a:avLst/>
           </a:prstGeom>
         </p:spPr>
         <p:txBody>
-          <a:bodyPr anchor="t" rtlCol="false" tIns="0" lIns="0" bIns="0" rIns="0">
+          <a:bodyPr lIns="0" tIns="0" rIns="0" bIns="0" rtlCol="0" anchor="t">
             <a:spAutoFit/>
           </a:bodyPr>
           <a:lstStyle/>
@@ -5485,7 +5011,7 @@
               </a:lnSpc>
             </a:pPr>
             <a:r>
-              <a:rPr lang="en-US" sz="3200">
+              <a:rPr lang="en-US" sz="2700" dirty="0">
                 <a:solidFill>
                   <a:srgbClr val="000000"/>
                 </a:solidFill>
@@ -5501,7 +5027,7 @@
               </a:lnSpc>
             </a:pPr>
             <a:r>
-              <a:rPr lang="en-US" sz="4599">
+              <a:rPr lang="en-US" sz="4599" dirty="0">
                 <a:solidFill>
                   <a:srgbClr val="FF3131"/>
                 </a:solidFill>
@@ -5514,21 +5040,21 @@
       </p:sp>
       <p:sp>
         <p:nvSpPr>
-          <p:cNvPr name="TextBox 8" id="8"/>
-          <p:cNvSpPr txBox="true"/>
+          <p:cNvPr id="8" name="TextBox 8"/>
+          <p:cNvSpPr txBox="1"/>
           <p:nvPr/>
         </p:nvSpPr>
         <p:spPr>
-          <a:xfrm rot="0">
-            <a:off x="5349912" y="3305862"/>
-            <a:ext cx="4110013" cy="1196277"/>
+          <a:xfrm>
+            <a:off x="4723683" y="3545627"/>
+            <a:ext cx="4659325" cy="1242263"/>
           </a:xfrm>
           <a:prstGeom prst="rect">
             <a:avLst/>
           </a:prstGeom>
         </p:spPr>
         <p:txBody>
-          <a:bodyPr anchor="t" rtlCol="false" tIns="0" lIns="0" bIns="0" rIns="0">
+          <a:bodyPr wrap="square" lIns="0" tIns="0" rIns="0" bIns="0" rtlCol="0" anchor="t">
             <a:spAutoFit/>
           </a:bodyPr>
           <a:lstStyle/>
@@ -5539,22 +5065,13 @@
               </a:lnSpc>
             </a:pPr>
             <a:r>
-              <a:rPr lang="en-US" sz="2922">
+              <a:rPr lang="en-US" sz="2700" dirty="0">
                 <a:solidFill>
                   <a:srgbClr val="000000"/>
                 </a:solidFill>
                 <a:latin typeface="Nunito"/>
               </a:rPr>
-              <a:t>Number of </a:t>
-            </a:r>
-            <a:r>
-              <a:rPr lang="en-US" sz="2922">
-                <a:solidFill>
-                  <a:srgbClr val="000000"/>
-                </a:solidFill>
-                <a:latin typeface="Nunito"/>
-              </a:rPr>
-              <a:t>ATTRIBUTES</a:t>
+              <a:t>Number of ATTRIBUTES</a:t>
             </a:r>
           </a:p>
           <a:p>
@@ -5564,7 +5081,7 @@
               </a:lnSpc>
             </a:pPr>
             <a:r>
-              <a:rPr lang="en-US" sz="4122">
+              <a:rPr lang="en-US" sz="4122" dirty="0">
                 <a:solidFill>
                   <a:srgbClr val="FF3131"/>
                 </a:solidFill>
@@ -5577,12 +5094,12 @@
       </p:sp>
       <p:sp>
         <p:nvSpPr>
-          <p:cNvPr name="TextBox 9" id="9"/>
-          <p:cNvSpPr txBox="true"/>
+          <p:cNvPr id="9" name="TextBox 9"/>
+          <p:cNvSpPr txBox="1"/>
           <p:nvPr/>
         </p:nvSpPr>
         <p:spPr>
-          <a:xfrm rot="0">
+          <a:xfrm>
             <a:off x="425371" y="6321589"/>
             <a:ext cx="4109302" cy="1192148"/>
           </a:xfrm>
@@ -5591,7 +5108,7 @@
           </a:prstGeom>
         </p:spPr>
         <p:txBody>
-          <a:bodyPr anchor="t" rtlCol="false" tIns="0" lIns="0" bIns="0" rIns="0">
+          <a:bodyPr lIns="0" tIns="0" rIns="0" bIns="0" rtlCol="0" anchor="t">
             <a:spAutoFit/>
           </a:bodyPr>
           <a:lstStyle/>
@@ -5602,7 +5119,7 @@
               </a:lnSpc>
             </a:pPr>
             <a:r>
-              <a:rPr lang="en-US" sz="2698">
+              <a:rPr lang="en-US" sz="2698" dirty="0">
                 <a:solidFill>
                   <a:srgbClr val="000000"/>
                 </a:solidFill>
@@ -5618,7 +5135,7 @@
               </a:lnSpc>
             </a:pPr>
             <a:r>
-              <a:rPr lang="en-US" sz="4317">
+              <a:rPr lang="en-US" sz="4317" dirty="0">
                 <a:solidFill>
                   <a:srgbClr val="FF3131"/>
                 </a:solidFill>
@@ -5631,21 +5148,21 @@
       </p:sp>
       <p:sp>
         <p:nvSpPr>
-          <p:cNvPr name="TextBox 10" id="10"/>
-          <p:cNvSpPr txBox="true"/>
+          <p:cNvPr id="10" name="TextBox 10"/>
+          <p:cNvSpPr txBox="1"/>
           <p:nvPr/>
         </p:nvSpPr>
         <p:spPr>
-          <a:xfrm rot="0">
+          <a:xfrm>
             <a:off x="4990200" y="6312064"/>
-            <a:ext cx="4960158" cy="1224081"/>
+            <a:ext cx="4960158" cy="1244571"/>
           </a:xfrm>
           <a:prstGeom prst="rect">
             <a:avLst/>
           </a:prstGeom>
         </p:spPr>
         <p:txBody>
-          <a:bodyPr anchor="t" rtlCol="false" tIns="0" lIns="0" bIns="0" rIns="0">
+          <a:bodyPr lIns="0" tIns="0" rIns="0" bIns="0" rtlCol="0" anchor="t">
             <a:spAutoFit/>
           </a:bodyPr>
           <a:lstStyle/>
@@ -5656,7 +5173,7 @@
               </a:lnSpc>
             </a:pPr>
             <a:r>
-              <a:rPr lang="en-US" sz="3000">
+              <a:rPr lang="en-US" sz="2700" dirty="0">
                 <a:solidFill>
                   <a:srgbClr val="000000"/>
                 </a:solidFill>
@@ -5672,7 +5189,7 @@
               </a:lnSpc>
             </a:pPr>
             <a:r>
-              <a:rPr lang="en-US" sz="4099">
+              <a:rPr lang="en-US" sz="4099" dirty="0">
                 <a:solidFill>
                   <a:srgbClr val="FF3131"/>
                 </a:solidFill>
@@ -5692,13 +5209,14 @@
 </file>
 
 <file path=ppt/slides/slide5.xml><?xml version="1.0" encoding="utf-8"?>
-<p:sld xmlns:p="http://schemas.openxmlformats.org/presentationml/2006/main" xmlns:a="http://schemas.openxmlformats.org/drawingml/2006/main" xmlns:r="http://schemas.openxmlformats.org/officeDocument/2006/relationships">
+<p:sld xmlns:a="http://schemas.openxmlformats.org/drawingml/2006/main" xmlns:r="http://schemas.openxmlformats.org/officeDocument/2006/relationships" xmlns:p="http://schemas.openxmlformats.org/presentationml/2006/main">
   <p:cSld>
     <p:bg>
       <p:bgPr>
         <a:solidFill>
           <a:srgbClr val="FFE6BF"/>
         </a:solidFill>
+        <a:effectLst/>
       </p:bgPr>
     </p:bg>
     <p:spTree>
@@ -5717,12 +5235,12 @@
       </p:grpSpPr>
       <p:sp>
         <p:nvSpPr>
-          <p:cNvPr name="Freeform 2" id="2"/>
+          <p:cNvPr id="2" name="Freeform 2"/>
           <p:cNvSpPr/>
           <p:nvPr/>
         </p:nvSpPr>
         <p:spPr>
-          <a:xfrm flipH="false" flipV="false" rot="0">
+          <a:xfrm>
             <a:off x="1056828" y="4178900"/>
             <a:ext cx="896379" cy="888536"/>
           </a:xfrm>
@@ -5731,9 +5249,9 @@
             <a:gdLst/>
             <a:ahLst/>
             <a:cxnLst/>
-            <a:rect r="r" b="b" t="t" l="l"/>
+            <a:rect l="l" t="t" r="r" b="b"/>
             <a:pathLst>
-              <a:path h="888536" w="896379">
+              <a:path w="896379" h="888536">
                 <a:moveTo>
                   <a:pt x="0" y="0"/>
                 </a:moveTo>
@@ -5762,19 +5280,19 @@
               </a:extLst>
             </a:blip>
             <a:stretch>
-              <a:fillRect l="0" t="0" r="0" b="0"/>
+              <a:fillRect/>
             </a:stretch>
           </a:blipFill>
         </p:spPr>
       </p:sp>
       <p:sp>
         <p:nvSpPr>
-          <p:cNvPr name="TextBox 3" id="3"/>
-          <p:cNvSpPr txBox="true"/>
+          <p:cNvPr id="3" name="TextBox 3"/>
+          <p:cNvSpPr txBox="1"/>
           <p:nvPr/>
         </p:nvSpPr>
         <p:spPr>
-          <a:xfrm rot="0">
+          <a:xfrm>
             <a:off x="597394" y="3381674"/>
             <a:ext cx="1754620" cy="505688"/>
           </a:xfrm>
@@ -5783,7 +5301,7 @@
           </a:prstGeom>
         </p:spPr>
         <p:txBody>
-          <a:bodyPr anchor="t" rtlCol="false" tIns="0" lIns="0" bIns="0" rIns="0">
+          <a:bodyPr lIns="0" tIns="0" rIns="0" bIns="0" rtlCol="0" anchor="t">
             <a:spAutoFit/>
           </a:bodyPr>
           <a:lstStyle/>
@@ -5807,12 +5325,12 @@
       </p:sp>
       <p:sp>
         <p:nvSpPr>
-          <p:cNvPr name="TextBox 4" id="4"/>
-          <p:cNvSpPr txBox="true"/>
+          <p:cNvPr id="4" name="TextBox 4"/>
+          <p:cNvSpPr txBox="1"/>
           <p:nvPr/>
         </p:nvSpPr>
         <p:spPr>
-          <a:xfrm rot="0">
+          <a:xfrm>
             <a:off x="1044811" y="5123626"/>
             <a:ext cx="2614405" cy="602832"/>
           </a:xfrm>
@@ -5821,7 +5339,7 @@
           </a:prstGeom>
         </p:spPr>
         <p:txBody>
-          <a:bodyPr anchor="t" rtlCol="false" tIns="0" lIns="0" bIns="0" rIns="0">
+          <a:bodyPr lIns="0" tIns="0" rIns="0" bIns="0" rtlCol="0" anchor="t">
             <a:spAutoFit/>
           </a:bodyPr>
           <a:lstStyle/>
@@ -5861,12 +5379,12 @@
       </p:sp>
       <p:sp>
         <p:nvSpPr>
-          <p:cNvPr name="TextBox 5" id="5"/>
-          <p:cNvSpPr txBox="true"/>
+          <p:cNvPr id="5" name="TextBox 5"/>
+          <p:cNvSpPr txBox="1"/>
           <p:nvPr/>
         </p:nvSpPr>
         <p:spPr>
-          <a:xfrm rot="0">
+          <a:xfrm>
             <a:off x="5227155" y="5123626"/>
             <a:ext cx="2761743" cy="602832"/>
           </a:xfrm>
@@ -5875,7 +5393,7 @@
           </a:prstGeom>
         </p:spPr>
         <p:txBody>
-          <a:bodyPr anchor="t" rtlCol="false" tIns="0" lIns="0" bIns="0" rIns="0">
+          <a:bodyPr lIns="0" tIns="0" rIns="0" bIns="0" rtlCol="0" anchor="t">
             <a:spAutoFit/>
           </a:bodyPr>
           <a:lstStyle/>
@@ -5915,12 +5433,12 @@
       </p:sp>
       <p:sp>
         <p:nvSpPr>
-          <p:cNvPr name="TextBox 6" id="6"/>
-          <p:cNvSpPr txBox="true"/>
+          <p:cNvPr id="6" name="TextBox 6"/>
+          <p:cNvSpPr txBox="1"/>
           <p:nvPr/>
         </p:nvSpPr>
         <p:spPr>
-          <a:xfrm rot="0">
+          <a:xfrm>
             <a:off x="1056828" y="6962646"/>
             <a:ext cx="3174054" cy="602832"/>
           </a:xfrm>
@@ -5929,7 +5447,7 @@
           </a:prstGeom>
         </p:spPr>
         <p:txBody>
-          <a:bodyPr anchor="t" rtlCol="false" tIns="0" lIns="0" bIns="0" rIns="0">
+          <a:bodyPr lIns="0" tIns="0" rIns="0" bIns="0" rtlCol="0" anchor="t">
             <a:spAutoFit/>
           </a:bodyPr>
           <a:lstStyle/>
@@ -5969,12 +5487,12 @@
       </p:sp>
       <p:sp>
         <p:nvSpPr>
-          <p:cNvPr name="TextBox 7" id="7"/>
-          <p:cNvSpPr txBox="true"/>
+          <p:cNvPr id="7" name="TextBox 7"/>
+          <p:cNvSpPr txBox="1"/>
           <p:nvPr/>
         </p:nvSpPr>
         <p:spPr>
-          <a:xfrm rot="0">
+          <a:xfrm>
             <a:off x="5040473" y="6962646"/>
             <a:ext cx="3174054" cy="602832"/>
           </a:xfrm>
@@ -5983,7 +5501,7 @@
           </a:prstGeom>
         </p:spPr>
         <p:txBody>
-          <a:bodyPr anchor="t" rtlCol="false" tIns="0" lIns="0" bIns="0" rIns="0">
+          <a:bodyPr lIns="0" tIns="0" rIns="0" bIns="0" rtlCol="0" anchor="t">
             <a:spAutoFit/>
           </a:bodyPr>
           <a:lstStyle/>
@@ -6023,12 +5541,12 @@
       </p:sp>
       <p:sp>
         <p:nvSpPr>
-          <p:cNvPr name="Freeform 8" id="8"/>
+          <p:cNvPr id="8" name="Freeform 8"/>
           <p:cNvSpPr/>
           <p:nvPr/>
         </p:nvSpPr>
         <p:spPr>
-          <a:xfrm flipH="false" flipV="false" rot="0">
+          <a:xfrm>
             <a:off x="2762837" y="4178900"/>
             <a:ext cx="896379" cy="888536"/>
           </a:xfrm>
@@ -6037,9 +5555,9 @@
             <a:gdLst/>
             <a:ahLst/>
             <a:cxnLst/>
-            <a:rect r="r" b="b" t="t" l="l"/>
+            <a:rect l="l" t="t" r="r" b="b"/>
             <a:pathLst>
-              <a:path h="888536" w="896379">
+              <a:path w="896379" h="888536">
                 <a:moveTo>
                   <a:pt x="0" y="0"/>
                 </a:moveTo>
@@ -6068,19 +5586,19 @@
               </a:extLst>
             </a:blip>
             <a:stretch>
-              <a:fillRect l="0" t="0" r="0" b="0"/>
+              <a:fillRect/>
             </a:stretch>
           </a:blipFill>
         </p:spPr>
       </p:sp>
       <p:sp>
         <p:nvSpPr>
-          <p:cNvPr name="Freeform 9" id="9"/>
+          <p:cNvPr id="9" name="Freeform 9"/>
           <p:cNvSpPr/>
           <p:nvPr/>
         </p:nvSpPr>
         <p:spPr>
-          <a:xfrm flipH="false" flipV="false" rot="0">
+          <a:xfrm>
             <a:off x="5227155" y="4178900"/>
             <a:ext cx="896379" cy="888536"/>
           </a:xfrm>
@@ -6089,9 +5607,9 @@
             <a:gdLst/>
             <a:ahLst/>
             <a:cxnLst/>
-            <a:rect r="r" b="b" t="t" l="l"/>
+            <a:rect l="l" t="t" r="r" b="b"/>
             <a:pathLst>
-              <a:path h="888536" w="896379">
+              <a:path w="896379" h="888536">
                 <a:moveTo>
                   <a:pt x="0" y="0"/>
                 </a:moveTo>
@@ -6120,19 +5638,19 @@
               </a:extLst>
             </a:blip>
             <a:stretch>
-              <a:fillRect l="0" t="0" r="0" b="0"/>
+              <a:fillRect/>
             </a:stretch>
           </a:blipFill>
         </p:spPr>
       </p:sp>
       <p:sp>
         <p:nvSpPr>
-          <p:cNvPr name="Freeform 10" id="10"/>
+          <p:cNvPr id="10" name="Freeform 10"/>
           <p:cNvSpPr/>
           <p:nvPr/>
         </p:nvSpPr>
         <p:spPr>
-          <a:xfrm flipH="false" flipV="false" rot="0">
+          <a:xfrm>
             <a:off x="7092519" y="4178900"/>
             <a:ext cx="896379" cy="888536"/>
           </a:xfrm>
@@ -6141,9 +5659,9 @@
             <a:gdLst/>
             <a:ahLst/>
             <a:cxnLst/>
-            <a:rect r="r" b="b" t="t" l="l"/>
+            <a:rect l="l" t="t" r="r" b="b"/>
             <a:pathLst>
-              <a:path h="888536" w="896379">
+              <a:path w="896379" h="888536">
                 <a:moveTo>
                   <a:pt x="0" y="0"/>
                 </a:moveTo>
@@ -6172,19 +5690,19 @@
               </a:extLst>
             </a:blip>
             <a:stretch>
-              <a:fillRect l="0" t="0" r="0" b="0"/>
+              <a:fillRect/>
             </a:stretch>
           </a:blipFill>
         </p:spPr>
       </p:sp>
       <p:sp>
         <p:nvSpPr>
-          <p:cNvPr name="Freeform 11" id="11"/>
+          <p:cNvPr id="11" name="Freeform 11"/>
           <p:cNvSpPr/>
           <p:nvPr/>
         </p:nvSpPr>
         <p:spPr>
-          <a:xfrm flipH="false" flipV="false" rot="0">
+          <a:xfrm>
             <a:off x="1101218" y="5811221"/>
             <a:ext cx="896379" cy="888536"/>
           </a:xfrm>
@@ -6193,9 +5711,9 @@
             <a:gdLst/>
             <a:ahLst/>
             <a:cxnLst/>
-            <a:rect r="r" b="b" t="t" l="l"/>
+            <a:rect l="l" t="t" r="r" b="b"/>
             <a:pathLst>
-              <a:path h="888536" w="896379">
+              <a:path w="896379" h="888536">
                 <a:moveTo>
                   <a:pt x="0" y="0"/>
                 </a:moveTo>
@@ -6224,19 +5742,19 @@
               </a:extLst>
             </a:blip>
             <a:stretch>
-              <a:fillRect l="0" t="0" r="0" b="0"/>
+              <a:fillRect/>
             </a:stretch>
           </a:blipFill>
         </p:spPr>
       </p:sp>
       <p:sp>
         <p:nvSpPr>
-          <p:cNvPr name="Freeform 12" id="12"/>
+          <p:cNvPr id="12" name="Freeform 12"/>
           <p:cNvSpPr/>
           <p:nvPr/>
         </p:nvSpPr>
         <p:spPr>
-          <a:xfrm flipH="false" flipV="false" rot="0">
+          <a:xfrm>
             <a:off x="3060821" y="5811221"/>
             <a:ext cx="896379" cy="888536"/>
           </a:xfrm>
@@ -6245,9 +5763,9 @@
             <a:gdLst/>
             <a:ahLst/>
             <a:cxnLst/>
-            <a:rect r="r" b="b" t="t" l="l"/>
+            <a:rect l="l" t="t" r="r" b="b"/>
             <a:pathLst>
-              <a:path h="888536" w="896379">
+              <a:path w="896379" h="888536">
                 <a:moveTo>
                   <a:pt x="0" y="0"/>
                 </a:moveTo>
@@ -6276,19 +5794,19 @@
               </a:extLst>
             </a:blip>
             <a:stretch>
-              <a:fillRect l="0" t="0" r="0" b="0"/>
+              <a:fillRect/>
             </a:stretch>
           </a:blipFill>
         </p:spPr>
       </p:sp>
       <p:sp>
         <p:nvSpPr>
-          <p:cNvPr name="Freeform 13" id="13"/>
+          <p:cNvPr id="13" name="Freeform 13"/>
           <p:cNvSpPr/>
           <p:nvPr/>
         </p:nvSpPr>
         <p:spPr>
-          <a:xfrm flipH="false" flipV="false" rot="0">
+          <a:xfrm>
             <a:off x="5040473" y="5811221"/>
             <a:ext cx="896379" cy="888536"/>
           </a:xfrm>
@@ -6297,9 +5815,9 @@
             <a:gdLst/>
             <a:ahLst/>
             <a:cxnLst/>
-            <a:rect r="r" b="b" t="t" l="l"/>
+            <a:rect l="l" t="t" r="r" b="b"/>
             <a:pathLst>
-              <a:path h="888536" w="896379">
+              <a:path w="896379" h="888536">
                 <a:moveTo>
                   <a:pt x="0" y="0"/>
                 </a:moveTo>
@@ -6328,19 +5846,19 @@
               </a:extLst>
             </a:blip>
             <a:stretch>
-              <a:fillRect l="0" t="0" r="0" b="0"/>
+              <a:fillRect/>
             </a:stretch>
           </a:blipFill>
         </p:spPr>
       </p:sp>
       <p:sp>
         <p:nvSpPr>
-          <p:cNvPr name="Freeform 14" id="14"/>
+          <p:cNvPr id="14" name="Freeform 14"/>
           <p:cNvSpPr/>
           <p:nvPr/>
         </p:nvSpPr>
         <p:spPr>
-          <a:xfrm flipH="false" flipV="false" rot="0">
+          <a:xfrm>
             <a:off x="7317196" y="5811221"/>
             <a:ext cx="896379" cy="888536"/>
           </a:xfrm>
@@ -6349,9 +5867,9 @@
             <a:gdLst/>
             <a:ahLst/>
             <a:cxnLst/>
-            <a:rect r="r" b="b" t="t" l="l"/>
+            <a:rect l="l" t="t" r="r" b="b"/>
             <a:pathLst>
-              <a:path h="888536" w="896379">
+              <a:path w="896379" h="888536">
                 <a:moveTo>
                   <a:pt x="0" y="0"/>
                 </a:moveTo>
@@ -6380,19 +5898,19 @@
               </a:extLst>
             </a:blip>
             <a:stretch>
-              <a:fillRect l="0" t="0" r="0" b="0"/>
+              <a:fillRect/>
             </a:stretch>
           </a:blipFill>
         </p:spPr>
       </p:sp>
       <p:sp>
         <p:nvSpPr>
-          <p:cNvPr name="TextBox 15" id="15"/>
-          <p:cNvSpPr txBox="true"/>
+          <p:cNvPr id="15" name="TextBox 15"/>
+          <p:cNvSpPr txBox="1"/>
           <p:nvPr/>
         </p:nvSpPr>
         <p:spPr>
-          <a:xfrm rot="0">
+          <a:xfrm>
             <a:off x="1863302" y="1189052"/>
             <a:ext cx="4931327" cy="1602073"/>
           </a:xfrm>
@@ -6401,7 +5919,7 @@
           </a:prstGeom>
         </p:spPr>
         <p:txBody>
-          <a:bodyPr anchor="t" rtlCol="false" tIns="0" lIns="0" bIns="0" rIns="0">
+          <a:bodyPr lIns="0" tIns="0" rIns="0" bIns="0" rtlCol="0" anchor="t">
             <a:spAutoFit/>
           </a:bodyPr>
           <a:lstStyle/>
@@ -6427,6 +5945,12 @@
                 <a:spcPts val="3243"/>
               </a:lnSpc>
             </a:pPr>
+            <a:endParaRPr lang="en-US" sz="2316">
+              <a:solidFill>
+                <a:srgbClr val="000000"/>
+              </a:solidFill>
+              <a:latin typeface="Nunito"/>
+            </a:endParaRPr>
           </a:p>
           <a:p>
             <a:pPr algn="ctr">
@@ -6434,6 +5958,12 @@
                 <a:spcPts val="3243"/>
               </a:lnSpc>
             </a:pPr>
+            <a:endParaRPr lang="en-US" sz="2316">
+              <a:solidFill>
+                <a:srgbClr val="000000"/>
+              </a:solidFill>
+              <a:latin typeface="Nunito"/>
+            </a:endParaRPr>
           </a:p>
           <a:p>
             <a:pPr algn="ctr">
@@ -6455,12 +5985,12 @@
       </p:sp>
       <p:sp>
         <p:nvSpPr>
-          <p:cNvPr name="Freeform 16" id="16"/>
+          <p:cNvPr id="16" name="Freeform 16"/>
           <p:cNvSpPr/>
           <p:nvPr/>
         </p:nvSpPr>
         <p:spPr>
-          <a:xfrm flipH="false" flipV="false" rot="0">
+          <a:xfrm>
             <a:off x="1053439" y="1028700"/>
             <a:ext cx="584247" cy="579135"/>
           </a:xfrm>
@@ -6469,9 +5999,9 @@
             <a:gdLst/>
             <a:ahLst/>
             <a:cxnLst/>
-            <a:rect r="r" b="b" t="t" l="l"/>
+            <a:rect l="l" t="t" r="r" b="b"/>
             <a:pathLst>
-              <a:path h="579135" w="584247">
+              <a:path w="584247" h="579135">
                 <a:moveTo>
                   <a:pt x="0" y="0"/>
                 </a:moveTo>
@@ -6500,19 +6030,19 @@
               </a:extLst>
             </a:blip>
             <a:stretch>
-              <a:fillRect l="0" t="0" r="0" b="0"/>
+              <a:fillRect/>
             </a:stretch>
           </a:blipFill>
         </p:spPr>
       </p:sp>
       <p:sp>
         <p:nvSpPr>
-          <p:cNvPr name="Freeform 17" id="17"/>
+          <p:cNvPr id="17" name="Freeform 17"/>
           <p:cNvSpPr/>
           <p:nvPr/>
         </p:nvSpPr>
         <p:spPr>
-          <a:xfrm flipH="false" flipV="false" rot="0">
+          <a:xfrm>
             <a:off x="1039676" y="2252319"/>
             <a:ext cx="543562" cy="538806"/>
           </a:xfrm>
@@ -6521,9 +6051,9 @@
             <a:gdLst/>
             <a:ahLst/>
             <a:cxnLst/>
-            <a:rect r="r" b="b" t="t" l="l"/>
+            <a:rect l="l" t="t" r="r" b="b"/>
             <a:pathLst>
-              <a:path h="538806" w="543562">
+              <a:path w="543562" h="538806">
                 <a:moveTo>
                   <a:pt x="0" y="0"/>
                 </a:moveTo>
@@ -6552,19 +6082,19 @@
               </a:extLst>
             </a:blip>
             <a:stretch>
-              <a:fillRect l="0" t="0" r="0" b="0"/>
+              <a:fillRect/>
             </a:stretch>
           </a:blipFill>
         </p:spPr>
       </p:sp>
       <p:sp>
         <p:nvSpPr>
-          <p:cNvPr name="Freeform 18" id="18"/>
+          <p:cNvPr id="18" name="Freeform 18"/>
           <p:cNvSpPr/>
           <p:nvPr/>
         </p:nvSpPr>
         <p:spPr>
-          <a:xfrm flipH="false" flipV="false" rot="0">
+          <a:xfrm>
             <a:off x="9414678" y="816844"/>
             <a:ext cx="9174202" cy="8784078"/>
           </a:xfrm>
@@ -6573,9 +6103,9 @@
             <a:gdLst/>
             <a:ahLst/>
             <a:cxnLst/>
-            <a:rect r="r" b="b" t="t" l="l"/>
+            <a:rect l="l" t="t" r="r" b="b"/>
             <a:pathLst>
-              <a:path h="8784078" w="9174202">
+              <a:path w="9174202" h="8784078">
                 <a:moveTo>
                   <a:pt x="0" y="0"/>
                 </a:moveTo>
@@ -6598,19 +6128,19 @@
           <a:blipFill>
             <a:blip r:embed="rId6"/>
             <a:stretch>
-              <a:fillRect l="0" t="0" r="0" b="0"/>
+              <a:fillRect/>
             </a:stretch>
           </a:blipFill>
         </p:spPr>
       </p:sp>
       <p:sp>
         <p:nvSpPr>
-          <p:cNvPr name="TextBox 19" id="19"/>
-          <p:cNvSpPr txBox="true"/>
+          <p:cNvPr id="19" name="TextBox 19"/>
+          <p:cNvSpPr txBox="1"/>
           <p:nvPr/>
         </p:nvSpPr>
         <p:spPr>
-          <a:xfrm rot="0">
+          <a:xfrm>
             <a:off x="236889" y="8375102"/>
             <a:ext cx="8907111" cy="1278890"/>
           </a:xfrm>
@@ -6619,7 +6149,7 @@
           </a:prstGeom>
         </p:spPr>
         <p:txBody>
-          <a:bodyPr anchor="t" rtlCol="false" tIns="0" lIns="0" bIns="0" rIns="0">
+          <a:bodyPr lIns="0" tIns="0" rIns="0" bIns="0" rtlCol="0" anchor="t">
             <a:spAutoFit/>
           </a:bodyPr>
           <a:lstStyle/>
@@ -6695,13 +6225,14 @@
 </file>
 
 <file path=ppt/slides/slide6.xml><?xml version="1.0" encoding="utf-8"?>
-<p:sld xmlns:p="http://schemas.openxmlformats.org/presentationml/2006/main" xmlns:a="http://schemas.openxmlformats.org/drawingml/2006/main" xmlns:r="http://schemas.openxmlformats.org/officeDocument/2006/relationships">
+<p:sld xmlns:a="http://schemas.openxmlformats.org/drawingml/2006/main" xmlns:r="http://schemas.openxmlformats.org/officeDocument/2006/relationships" xmlns:p="http://schemas.openxmlformats.org/presentationml/2006/main">
   <p:cSld>
     <p:bg>
       <p:bgPr>
         <a:solidFill>
           <a:srgbClr val="FFE6BF"/>
         </a:solidFill>
+        <a:effectLst/>
       </p:bgPr>
     </p:bg>
     <p:spTree>
@@ -6720,26 +6251,26 @@
       </p:grpSpPr>
       <p:grpSp>
         <p:nvGrpSpPr>
-          <p:cNvPr name="Group 2" id="2"/>
+          <p:cNvPr id="2" name="Group 2"/>
           <p:cNvGrpSpPr/>
           <p:nvPr/>
         </p:nvGrpSpPr>
         <p:grpSpPr>
-          <a:xfrm rot="0">
-            <a:off x="7030832" y="7627374"/>
-            <a:ext cx="11257168" cy="2659626"/>
-            <a:chOff x="0" y="0"/>
-            <a:chExt cx="2964851" cy="700478"/>
+          <a:xfrm>
+            <a:off x="7030832" y="7410383"/>
+            <a:ext cx="11257168" cy="3303090"/>
+            <a:chOff x="0" y="-57150"/>
+            <a:chExt cx="2964851" cy="869950"/>
           </a:xfrm>
         </p:grpSpPr>
         <p:sp>
           <p:nvSpPr>
-            <p:cNvPr name="Freeform 3" id="3"/>
+            <p:cNvPr id="3" name="Freeform 3"/>
             <p:cNvSpPr/>
             <p:nvPr/>
           </p:nvSpPr>
           <p:spPr>
-            <a:xfrm flipH="false" flipV="false" rot="0">
+            <a:xfrm>
               <a:off x="0" y="0"/>
               <a:ext cx="2964851" cy="700478"/>
             </a:xfrm>
@@ -6748,9 +6279,9 @@
               <a:gdLst/>
               <a:ahLst/>
               <a:cxnLst/>
-              <a:rect r="r" b="b" t="t" l="l"/>
+              <a:rect l="l" t="t" r="r" b="b"/>
               <a:pathLst>
-                <a:path h="700478" w="2964851">
+                <a:path w="2964851" h="700478">
                   <a:moveTo>
                     <a:pt x="0" y="0"/>
                   </a:moveTo>
@@ -6774,21 +6305,21 @@
         </p:sp>
         <p:sp>
           <p:nvSpPr>
-            <p:cNvPr name="TextBox 4" id="4"/>
-            <p:cNvSpPr txBox="true"/>
+            <p:cNvPr id="4" name="TextBox 4"/>
+            <p:cNvSpPr txBox="1"/>
             <p:nvPr/>
           </p:nvSpPr>
           <p:spPr>
             <a:xfrm>
               <a:off x="0" y="-57150"/>
-              <a:ext cx="812800" cy="869950"/>
+              <a:ext cx="2663814" cy="869950"/>
             </a:xfrm>
             <a:prstGeom prst="rect">
               <a:avLst/>
             </a:prstGeom>
           </p:spPr>
           <p:txBody>
-            <a:bodyPr anchor="ctr" rtlCol="false" tIns="50800" lIns="50800" bIns="50800" rIns="50800"/>
+            <a:bodyPr lIns="50800" tIns="50800" rIns="50800" bIns="50800" rtlCol="0" anchor="ctr"/>
             <a:lstStyle/>
             <a:p>
               <a:pPr algn="ctr">
@@ -6797,16 +6328,151 @@
                 </a:lnSpc>
               </a:pPr>
               <a:r>
-                <a:rPr lang="en-US" sz="3208">
+                <a:rPr lang="en-US" sz="3208" dirty="0" err="1">
                   <a:solidFill>
                     <a:srgbClr val="000000"/>
                   </a:solidFill>
                   <a:latin typeface="Nunito"/>
                 </a:rPr>
-                <a:t>Phương thức hoạt động của các giao dịch </a:t>
+                <a:t>Phương</a:t>
               </a:r>
               <a:r>
-                <a:rPr lang="en-US" sz="3208">
+                <a:rPr lang="en-US" sz="3208" dirty="0">
+                  <a:solidFill>
+                    <a:srgbClr val="000000"/>
+                  </a:solidFill>
+                  <a:latin typeface="Nunito"/>
+                </a:rPr>
+                <a:t> </a:t>
+              </a:r>
+              <a:r>
+                <a:rPr lang="en-US" sz="3208" dirty="0" err="1">
+                  <a:solidFill>
+                    <a:srgbClr val="000000"/>
+                  </a:solidFill>
+                  <a:latin typeface="Nunito"/>
+                </a:rPr>
+                <a:t>thức</a:t>
+              </a:r>
+              <a:r>
+                <a:rPr lang="en-US" sz="3208" dirty="0">
+                  <a:solidFill>
+                    <a:srgbClr val="000000"/>
+                  </a:solidFill>
+                  <a:latin typeface="Nunito"/>
+                </a:rPr>
+                <a:t> </a:t>
+              </a:r>
+              <a:r>
+                <a:rPr lang="en-US" sz="3208" dirty="0" err="1">
+                  <a:solidFill>
+                    <a:srgbClr val="000000"/>
+                  </a:solidFill>
+                  <a:latin typeface="Nunito"/>
+                </a:rPr>
+                <a:t>hoạt</a:t>
+              </a:r>
+              <a:r>
+                <a:rPr lang="en-US" sz="3208" dirty="0">
+                  <a:solidFill>
+                    <a:srgbClr val="000000"/>
+                  </a:solidFill>
+                  <a:latin typeface="Nunito"/>
+                </a:rPr>
+                <a:t> </a:t>
+              </a:r>
+              <a:r>
+                <a:rPr lang="en-US" sz="3208" dirty="0" err="1">
+                  <a:solidFill>
+                    <a:srgbClr val="000000"/>
+                  </a:solidFill>
+                  <a:latin typeface="Nunito"/>
+                </a:rPr>
+                <a:t>động</a:t>
+              </a:r>
+              <a:r>
+                <a:rPr lang="en-US" sz="3208" dirty="0">
+                  <a:solidFill>
+                    <a:srgbClr val="000000"/>
+                  </a:solidFill>
+                  <a:latin typeface="Nunito"/>
+                </a:rPr>
+                <a:t> </a:t>
+              </a:r>
+              <a:r>
+                <a:rPr lang="en-US" sz="3208" dirty="0" err="1">
+                  <a:solidFill>
+                    <a:srgbClr val="000000"/>
+                  </a:solidFill>
+                  <a:latin typeface="Nunito"/>
+                </a:rPr>
+                <a:t>của</a:t>
+              </a:r>
+              <a:r>
+                <a:rPr lang="en-US" sz="3208" dirty="0">
+                  <a:solidFill>
+                    <a:srgbClr val="000000"/>
+                  </a:solidFill>
+                  <a:latin typeface="Nunito"/>
+                </a:rPr>
+                <a:t> </a:t>
+              </a:r>
+              <a:r>
+                <a:rPr lang="en-US" sz="3208" dirty="0" err="1">
+                  <a:solidFill>
+                    <a:srgbClr val="000000"/>
+                  </a:solidFill>
+                  <a:latin typeface="Nunito"/>
+                </a:rPr>
+                <a:t>các</a:t>
+              </a:r>
+              <a:r>
+                <a:rPr lang="en-US" sz="3208" dirty="0">
+                  <a:solidFill>
+                    <a:srgbClr val="000000"/>
+                  </a:solidFill>
+                  <a:latin typeface="Nunito"/>
+                </a:rPr>
+                <a:t> </a:t>
+              </a:r>
+              <a:r>
+                <a:rPr lang="en-US" sz="3208" dirty="0" err="1">
+                  <a:solidFill>
+                    <a:srgbClr val="000000"/>
+                  </a:solidFill>
+                  <a:latin typeface="Nunito"/>
+                </a:rPr>
+                <a:t>giao</a:t>
+              </a:r>
+              <a:r>
+                <a:rPr lang="en-US" sz="3208" dirty="0">
+                  <a:solidFill>
+                    <a:srgbClr val="000000"/>
+                  </a:solidFill>
+                  <a:latin typeface="Nunito"/>
+                </a:rPr>
+                <a:t> </a:t>
+              </a:r>
+              <a:r>
+                <a:rPr lang="en-US" sz="3208" dirty="0" err="1">
+                  <a:solidFill>
+                    <a:srgbClr val="000000"/>
+                  </a:solidFill>
+                  <a:latin typeface="Nunito"/>
+                </a:rPr>
+                <a:t>dịch</a:t>
+              </a:r>
+              <a:r>
+                <a:rPr lang="en-US" sz="3208" dirty="0">
+                  <a:solidFill>
+                    <a:srgbClr val="000000"/>
+                  </a:solidFill>
+                  <a:latin typeface="Nunito"/>
+                </a:rPr>
+                <a:t> </a:t>
+              </a:r>
+              <a:r>
+                <a:rPr lang="en-US" sz="3208" dirty="0">
                   <a:solidFill>
                     <a:srgbClr val="FF3131"/>
                   </a:solidFill>
@@ -6815,26 +6481,383 @@
                 <a:t>LỪA ĐẢO</a:t>
               </a:r>
               <a:r>
-                <a:rPr lang="en-US" sz="3208">
+                <a:rPr lang="en-US" sz="3208" dirty="0">
                   <a:solidFill>
                     <a:srgbClr val="000000"/>
                   </a:solidFill>
                   <a:latin typeface="Nunito"/>
                 </a:rPr>
-                <a:t> là chuyển tiền vào một tài khoản cụ thể và sau đó rút tiền mặt từ các tài khoản đó</a:t>
+                <a:t> </a:t>
               </a:r>
+              <a:r>
+                <a:rPr lang="en-US" sz="3208" dirty="0" err="1">
+                  <a:solidFill>
+                    <a:srgbClr val="000000"/>
+                  </a:solidFill>
+                  <a:latin typeface="Nunito"/>
+                </a:rPr>
+                <a:t>là</a:t>
+              </a:r>
+              <a:r>
+                <a:rPr lang="en-US" sz="3208" dirty="0">
+                  <a:solidFill>
+                    <a:srgbClr val="000000"/>
+                  </a:solidFill>
+                  <a:latin typeface="Nunito"/>
+                </a:rPr>
+                <a:t> </a:t>
+              </a:r>
+              <a:r>
+                <a:rPr lang="en-US" sz="3208" dirty="0" err="1">
+                  <a:solidFill>
+                    <a:srgbClr val="000000"/>
+                  </a:solidFill>
+                  <a:latin typeface="Nunito"/>
+                </a:rPr>
+                <a:t>chuyển</a:t>
+              </a:r>
+              <a:r>
+                <a:rPr lang="en-US" sz="3208" dirty="0">
+                  <a:solidFill>
+                    <a:srgbClr val="000000"/>
+                  </a:solidFill>
+                  <a:latin typeface="Nunito"/>
+                </a:rPr>
+                <a:t> </a:t>
+              </a:r>
+              <a:r>
+                <a:rPr lang="en-US" sz="3208" dirty="0" err="1">
+                  <a:solidFill>
+                    <a:srgbClr val="000000"/>
+                  </a:solidFill>
+                  <a:latin typeface="Nunito"/>
+                </a:rPr>
+                <a:t>tiền</a:t>
+              </a:r>
+              <a:r>
+                <a:rPr lang="en-US" sz="3208" dirty="0">
+                  <a:solidFill>
+                    <a:srgbClr val="000000"/>
+                  </a:solidFill>
+                  <a:latin typeface="Nunito"/>
+                </a:rPr>
+                <a:t> </a:t>
+              </a:r>
+              <a:r>
+                <a:rPr lang="en-US" sz="3208" dirty="0" err="1">
+                  <a:solidFill>
+                    <a:srgbClr val="000000"/>
+                  </a:solidFill>
+                  <a:latin typeface="Nunito"/>
+                </a:rPr>
+                <a:t>vào</a:t>
+              </a:r>
+              <a:r>
+                <a:rPr lang="en-US" sz="3208" dirty="0">
+                  <a:solidFill>
+                    <a:srgbClr val="000000"/>
+                  </a:solidFill>
+                  <a:latin typeface="Nunito"/>
+                </a:rPr>
+                <a:t> </a:t>
+              </a:r>
+              <a:r>
+                <a:rPr lang="en-US" sz="3208" dirty="0" err="1">
+                  <a:solidFill>
+                    <a:srgbClr val="000000"/>
+                  </a:solidFill>
+                  <a:latin typeface="Nunito"/>
+                </a:rPr>
+                <a:t>một</a:t>
+              </a:r>
+              <a:r>
+                <a:rPr lang="en-US" sz="3208" dirty="0">
+                  <a:solidFill>
+                    <a:srgbClr val="000000"/>
+                  </a:solidFill>
+                  <a:latin typeface="Nunito"/>
+                </a:rPr>
+                <a:t> </a:t>
+              </a:r>
+              <a:r>
+                <a:rPr lang="en-US" sz="3208" dirty="0" err="1">
+                  <a:solidFill>
+                    <a:srgbClr val="000000"/>
+                  </a:solidFill>
+                  <a:latin typeface="Nunito"/>
+                </a:rPr>
+                <a:t>tài</a:t>
+              </a:r>
+              <a:r>
+                <a:rPr lang="en-US" sz="3208" dirty="0">
+                  <a:solidFill>
+                    <a:srgbClr val="000000"/>
+                  </a:solidFill>
+                  <a:latin typeface="Nunito"/>
+                </a:rPr>
+                <a:t> </a:t>
+              </a:r>
+              <a:r>
+                <a:rPr lang="en-US" sz="3208" dirty="0" err="1">
+                  <a:solidFill>
+                    <a:srgbClr val="000000"/>
+                  </a:solidFill>
+                  <a:latin typeface="Nunito"/>
+                </a:rPr>
+                <a:t>khoản</a:t>
+              </a:r>
+              <a:r>
+                <a:rPr lang="en-US" sz="3208" dirty="0">
+                  <a:solidFill>
+                    <a:srgbClr val="000000"/>
+                  </a:solidFill>
+                  <a:latin typeface="Nunito"/>
+                </a:rPr>
+                <a:t> </a:t>
+              </a:r>
+              <a:r>
+                <a:rPr lang="en-US" sz="3208" dirty="0" err="1">
+                  <a:solidFill>
+                    <a:srgbClr val="000000"/>
+                  </a:solidFill>
+                  <a:latin typeface="Nunito"/>
+                </a:rPr>
+                <a:t>cụ</a:t>
+              </a:r>
+              <a:r>
+                <a:rPr lang="en-US" sz="3208" dirty="0">
+                  <a:solidFill>
+                    <a:srgbClr val="000000"/>
+                  </a:solidFill>
+                  <a:latin typeface="Nunito"/>
+                </a:rPr>
+                <a:t> </a:t>
+              </a:r>
+              <a:r>
+                <a:rPr lang="en-US" sz="3208" dirty="0" err="1">
+                  <a:solidFill>
+                    <a:srgbClr val="000000"/>
+                  </a:solidFill>
+                  <a:latin typeface="Nunito"/>
+                </a:rPr>
+                <a:t>thể</a:t>
+              </a:r>
+              <a:r>
+                <a:rPr lang="en-US" sz="3208" dirty="0">
+                  <a:solidFill>
+                    <a:srgbClr val="000000"/>
+                  </a:solidFill>
+                  <a:latin typeface="Nunito"/>
+                </a:rPr>
+                <a:t> </a:t>
+              </a:r>
+              <a:r>
+                <a:rPr lang="en-US" sz="3208" dirty="0" err="1">
+                  <a:solidFill>
+                    <a:srgbClr val="000000"/>
+                  </a:solidFill>
+                  <a:latin typeface="Nunito"/>
+                </a:rPr>
+                <a:t>và</a:t>
+              </a:r>
+              <a:r>
+                <a:rPr lang="en-US" sz="3208" dirty="0">
+                  <a:solidFill>
+                    <a:srgbClr val="000000"/>
+                  </a:solidFill>
+                  <a:latin typeface="Nunito"/>
+                </a:rPr>
+                <a:t> </a:t>
+              </a:r>
+              <a:r>
+                <a:rPr lang="en-US" sz="3208" dirty="0" err="1">
+                  <a:solidFill>
+                    <a:srgbClr val="000000"/>
+                  </a:solidFill>
+                  <a:latin typeface="Nunito"/>
+                </a:rPr>
+                <a:t>sau</a:t>
+              </a:r>
+              <a:r>
+                <a:rPr lang="en-US" sz="3208" dirty="0">
+                  <a:solidFill>
+                    <a:srgbClr val="000000"/>
+                  </a:solidFill>
+                  <a:latin typeface="Nunito"/>
+                </a:rPr>
+                <a:t> </a:t>
+              </a:r>
+              <a:r>
+                <a:rPr lang="en-US" sz="3208" dirty="0" err="1">
+                  <a:solidFill>
+                    <a:srgbClr val="000000"/>
+                  </a:solidFill>
+                  <a:latin typeface="Nunito"/>
+                </a:rPr>
+                <a:t>đó</a:t>
+              </a:r>
+              <a:r>
+                <a:rPr lang="en-US" sz="3208" dirty="0">
+                  <a:solidFill>
+                    <a:srgbClr val="000000"/>
+                  </a:solidFill>
+                  <a:latin typeface="Nunito"/>
+                </a:rPr>
+                <a:t> </a:t>
+              </a:r>
+              <a:r>
+                <a:rPr lang="en-US" sz="3208" dirty="0" err="1">
+                  <a:solidFill>
+                    <a:srgbClr val="000000"/>
+                  </a:solidFill>
+                  <a:latin typeface="Nunito"/>
+                </a:rPr>
+                <a:t>rút</a:t>
+              </a:r>
+              <a:r>
+                <a:rPr lang="en-US" sz="3208" dirty="0">
+                  <a:solidFill>
+                    <a:srgbClr val="000000"/>
+                  </a:solidFill>
+                  <a:latin typeface="Nunito"/>
+                </a:rPr>
+                <a:t> </a:t>
+              </a:r>
+              <a:r>
+                <a:rPr lang="en-US" sz="3208" dirty="0" err="1">
+                  <a:solidFill>
+                    <a:srgbClr val="000000"/>
+                  </a:solidFill>
+                  <a:latin typeface="Nunito"/>
+                </a:rPr>
+                <a:t>tiền</a:t>
+              </a:r>
+              <a:r>
+                <a:rPr lang="en-US" sz="3208" dirty="0">
+                  <a:solidFill>
+                    <a:srgbClr val="000000"/>
+                  </a:solidFill>
+                  <a:latin typeface="Nunito"/>
+                </a:rPr>
+                <a:t> </a:t>
+              </a:r>
+              <a:r>
+                <a:rPr lang="en-US" sz="3208" dirty="0" err="1">
+                  <a:solidFill>
+                    <a:srgbClr val="000000"/>
+                  </a:solidFill>
+                  <a:latin typeface="Nunito"/>
+                </a:rPr>
+                <a:t>mặt</a:t>
+              </a:r>
+              <a:r>
+                <a:rPr lang="en-US" sz="3208" dirty="0">
+                  <a:solidFill>
+                    <a:srgbClr val="000000"/>
+                  </a:solidFill>
+                  <a:latin typeface="Nunito"/>
+                </a:rPr>
+                <a:t> </a:t>
+              </a:r>
+              <a:r>
+                <a:rPr lang="en-US" sz="3208" dirty="0" err="1">
+                  <a:solidFill>
+                    <a:srgbClr val="000000"/>
+                  </a:solidFill>
+                  <a:latin typeface="Nunito"/>
+                </a:rPr>
+                <a:t>từ</a:t>
+              </a:r>
+              <a:r>
+                <a:rPr lang="en-US" sz="3208" dirty="0">
+                  <a:solidFill>
+                    <a:srgbClr val="000000"/>
+                  </a:solidFill>
+                  <a:latin typeface="Nunito"/>
+                </a:rPr>
+                <a:t> </a:t>
+              </a:r>
+              <a:r>
+                <a:rPr lang="en-US" sz="3208" dirty="0" err="1">
+                  <a:solidFill>
+                    <a:srgbClr val="000000"/>
+                  </a:solidFill>
+                  <a:latin typeface="Nunito"/>
+                </a:rPr>
+                <a:t>các</a:t>
+              </a:r>
+              <a:r>
+                <a:rPr lang="en-US" sz="3208" dirty="0">
+                  <a:solidFill>
+                    <a:srgbClr val="000000"/>
+                  </a:solidFill>
+                  <a:latin typeface="Nunito"/>
+                </a:rPr>
+                <a:t> </a:t>
+              </a:r>
+              <a:r>
+                <a:rPr lang="en-US" sz="3208" dirty="0" err="1">
+                  <a:solidFill>
+                    <a:srgbClr val="000000"/>
+                  </a:solidFill>
+                  <a:latin typeface="Nunito"/>
+                </a:rPr>
+                <a:t>tài</a:t>
+              </a:r>
+              <a:r>
+                <a:rPr lang="en-US" sz="3208" dirty="0">
+                  <a:solidFill>
+                    <a:srgbClr val="000000"/>
+                  </a:solidFill>
+                  <a:latin typeface="Nunito"/>
+                </a:rPr>
+                <a:t> </a:t>
+              </a:r>
+              <a:r>
+                <a:rPr lang="en-US" sz="3208" dirty="0" err="1">
+                  <a:solidFill>
+                    <a:srgbClr val="000000"/>
+                  </a:solidFill>
+                  <a:latin typeface="Nunito"/>
+                </a:rPr>
+                <a:t>khoản</a:t>
+              </a:r>
+              <a:r>
+                <a:rPr lang="en-US" sz="3208" dirty="0">
+                  <a:solidFill>
+                    <a:srgbClr val="000000"/>
+                  </a:solidFill>
+                  <a:latin typeface="Nunito"/>
+                </a:rPr>
+                <a:t> </a:t>
+              </a:r>
+              <a:r>
+                <a:rPr lang="en-US" sz="3208" dirty="0" err="1">
+                  <a:solidFill>
+                    <a:srgbClr val="000000"/>
+                  </a:solidFill>
+                  <a:latin typeface="Nunito"/>
+                </a:rPr>
+                <a:t>đó</a:t>
+              </a:r>
+              <a:endParaRPr lang="en-US" sz="3208" dirty="0">
+                <a:solidFill>
+                  <a:srgbClr val="000000"/>
+                </a:solidFill>
+                <a:latin typeface="Nunito"/>
+              </a:endParaRPr>
             </a:p>
           </p:txBody>
         </p:sp>
       </p:grpSp>
       <p:sp>
         <p:nvSpPr>
-          <p:cNvPr name="Freeform 5" id="5"/>
+          <p:cNvPr id="5" name="Freeform 5"/>
           <p:cNvSpPr/>
           <p:nvPr/>
         </p:nvSpPr>
         <p:spPr>
-          <a:xfrm flipH="false" flipV="false" rot="0">
+          <a:xfrm>
             <a:off x="571019" y="0"/>
             <a:ext cx="17145961" cy="7926092"/>
           </a:xfrm>
@@ -6843,9 +6866,9 @@
             <a:gdLst/>
             <a:ahLst/>
             <a:cxnLst/>
-            <a:rect r="r" b="b" t="t" l="l"/>
+            <a:rect l="l" t="t" r="r" b="b"/>
             <a:pathLst>
-              <a:path h="7926092" w="17145961">
+              <a:path w="17145961" h="7926092">
                 <a:moveTo>
                   <a:pt x="0" y="0"/>
                 </a:moveTo>
@@ -6868,19 +6891,19 @@
           <a:blipFill>
             <a:blip r:embed="rId2"/>
             <a:stretch>
-              <a:fillRect l="0" t="0" r="0" b="0"/>
+              <a:fillRect/>
             </a:stretch>
           </a:blipFill>
         </p:spPr>
       </p:sp>
       <p:sp>
         <p:nvSpPr>
-          <p:cNvPr name="TextBox 6" id="6"/>
-          <p:cNvSpPr txBox="true"/>
+          <p:cNvPr id="6" name="TextBox 6"/>
+          <p:cNvSpPr txBox="1"/>
           <p:nvPr/>
         </p:nvSpPr>
         <p:spPr>
-          <a:xfrm rot="0">
+          <a:xfrm>
             <a:off x="571019" y="8474093"/>
             <a:ext cx="5986708" cy="861413"/>
           </a:xfrm>
@@ -6889,7 +6912,7 @@
           </a:prstGeom>
         </p:spPr>
         <p:txBody>
-          <a:bodyPr anchor="t" rtlCol="false" tIns="0" lIns="0" bIns="0" rIns="0">
+          <a:bodyPr lIns="0" tIns="0" rIns="0" bIns="0" rtlCol="0" anchor="t">
             <a:spAutoFit/>
           </a:bodyPr>
           <a:lstStyle/>
@@ -6920,13 +6943,14 @@
 </file>
 
 <file path=ppt/slides/slide7.xml><?xml version="1.0" encoding="utf-8"?>
-<p:sld xmlns:p="http://schemas.openxmlformats.org/presentationml/2006/main" xmlns:a="http://schemas.openxmlformats.org/drawingml/2006/main" xmlns:r="http://schemas.openxmlformats.org/officeDocument/2006/relationships">
+<p:sld xmlns:a="http://schemas.openxmlformats.org/drawingml/2006/main" xmlns:r="http://schemas.openxmlformats.org/officeDocument/2006/relationships" xmlns:p="http://schemas.openxmlformats.org/presentationml/2006/main">
   <p:cSld>
     <p:bg>
       <p:bgPr>
         <a:solidFill>
           <a:srgbClr val="FFE6BF"/>
         </a:solidFill>
+        <a:effectLst/>
       </p:bgPr>
     </p:bg>
     <p:spTree>
@@ -6945,12 +6969,12 @@
       </p:grpSpPr>
       <p:sp>
         <p:nvSpPr>
-          <p:cNvPr name="Freeform 2" id="2"/>
+          <p:cNvPr id="2" name="Freeform 2"/>
           <p:cNvSpPr/>
           <p:nvPr/>
         </p:nvSpPr>
         <p:spPr>
-          <a:xfrm flipH="false" flipV="false" rot="0">
+          <a:xfrm>
             <a:off x="5635560" y="1028700"/>
             <a:ext cx="12652440" cy="8511049"/>
           </a:xfrm>
@@ -6959,9 +6983,9 @@
             <a:gdLst/>
             <a:ahLst/>
             <a:cxnLst/>
-            <a:rect r="r" b="b" t="t" l="l"/>
+            <a:rect l="l" t="t" r="r" b="b"/>
             <a:pathLst>
-              <a:path h="8511049" w="12652440">
+              <a:path w="12652440" h="8511049">
                 <a:moveTo>
                   <a:pt x="0" y="0"/>
                 </a:moveTo>
@@ -6984,19 +7008,19 @@
           <a:blipFill>
             <a:blip r:embed="rId2"/>
             <a:stretch>
-              <a:fillRect l="0" t="0" r="0" b="0"/>
+              <a:fillRect/>
             </a:stretch>
           </a:blipFill>
         </p:spPr>
       </p:sp>
       <p:sp>
         <p:nvSpPr>
-          <p:cNvPr name="TextBox 3" id="3"/>
-          <p:cNvSpPr txBox="true"/>
+          <p:cNvPr id="3" name="TextBox 3"/>
+          <p:cNvSpPr txBox="1"/>
           <p:nvPr/>
         </p:nvSpPr>
         <p:spPr>
-          <a:xfrm rot="0">
+          <a:xfrm>
             <a:off x="429357" y="4219967"/>
             <a:ext cx="4610184" cy="1780391"/>
           </a:xfrm>
@@ -7005,7 +7029,7 @@
           </a:prstGeom>
         </p:spPr>
         <p:txBody>
-          <a:bodyPr anchor="t" rtlCol="false" tIns="0" lIns="0" bIns="0" rIns="0">
+          <a:bodyPr lIns="0" tIns="0" rIns="0" bIns="0" rtlCol="0" anchor="t">
             <a:spAutoFit/>
           </a:bodyPr>
           <a:lstStyle/>
@@ -7036,13 +7060,14 @@
 </file>
 
 <file path=ppt/slides/slide8.xml><?xml version="1.0" encoding="utf-8"?>
-<p:sld xmlns:p="http://schemas.openxmlformats.org/presentationml/2006/main" xmlns:a="http://schemas.openxmlformats.org/drawingml/2006/main">
+<p:sld xmlns:a="http://schemas.openxmlformats.org/drawingml/2006/main" xmlns:r="http://schemas.openxmlformats.org/officeDocument/2006/relationships" xmlns:p="http://schemas.openxmlformats.org/presentationml/2006/main">
   <p:cSld>
     <p:bg>
       <p:bgPr>
         <a:solidFill>
           <a:srgbClr val="FFE6BF"/>
         </a:solidFill>
+        <a:effectLst/>
       </p:bgPr>
     </p:bg>
     <p:spTree>
@@ -7061,12 +7086,12 @@
       </p:grpSpPr>
       <p:sp>
         <p:nvSpPr>
-          <p:cNvPr name="TextBox 2" id="2"/>
-          <p:cNvSpPr txBox="true"/>
+          <p:cNvPr id="2" name="TextBox 2"/>
+          <p:cNvSpPr txBox="1"/>
           <p:nvPr/>
         </p:nvSpPr>
         <p:spPr>
-          <a:xfrm rot="0">
+          <a:xfrm>
             <a:off x="3822692" y="4254956"/>
             <a:ext cx="10642617" cy="1596113"/>
           </a:xfrm>
@@ -7075,7 +7100,7 @@
           </a:prstGeom>
         </p:spPr>
         <p:txBody>
-          <a:bodyPr anchor="t" rtlCol="false" tIns="0" lIns="0" bIns="0" rIns="0">
+          <a:bodyPr lIns="0" tIns="0" rIns="0" bIns="0" rtlCol="0" anchor="t">
             <a:spAutoFit/>
           </a:bodyPr>
           <a:lstStyle/>
@@ -7106,13 +7131,14 @@
 </file>
 
 <file path=ppt/slides/slide9.xml><?xml version="1.0" encoding="utf-8"?>
-<p:sld xmlns:p="http://schemas.openxmlformats.org/presentationml/2006/main" xmlns:a="http://schemas.openxmlformats.org/drawingml/2006/main" xmlns:r="http://schemas.openxmlformats.org/officeDocument/2006/relationships">
+<p:sld xmlns:a="http://schemas.openxmlformats.org/drawingml/2006/main" xmlns:r="http://schemas.openxmlformats.org/officeDocument/2006/relationships" xmlns:p="http://schemas.openxmlformats.org/presentationml/2006/main">
   <p:cSld>
     <p:bg>
       <p:bgPr>
         <a:solidFill>
           <a:srgbClr val="FFE6BF"/>
         </a:solidFill>
+        <a:effectLst/>
       </p:bgPr>
     </p:bg>
     <p:spTree>
@@ -7131,12 +7157,12 @@
       </p:grpSpPr>
       <p:sp>
         <p:nvSpPr>
-          <p:cNvPr name="Freeform 2" id="2"/>
+          <p:cNvPr id="2" name="Freeform 2"/>
           <p:cNvSpPr/>
           <p:nvPr/>
         </p:nvSpPr>
         <p:spPr>
-          <a:xfrm flipH="false" flipV="false" rot="0">
+          <a:xfrm>
             <a:off x="0" y="0"/>
             <a:ext cx="18491943" cy="6263400"/>
           </a:xfrm>
@@ -7145,9 +7171,9 @@
             <a:gdLst/>
             <a:ahLst/>
             <a:cxnLst/>
-            <a:rect r="r" b="b" t="t" l="l"/>
+            <a:rect l="l" t="t" r="r" b="b"/>
             <a:pathLst>
-              <a:path h="6263400" w="18491943">
+              <a:path w="18491943" h="6263400">
                 <a:moveTo>
                   <a:pt x="0" y="0"/>
                 </a:moveTo>
@@ -7170,19 +7196,19 @@
           <a:blipFill>
             <a:blip r:embed="rId2"/>
             <a:stretch>
-              <a:fillRect l="0" t="0" r="0" b="0"/>
+              <a:fillRect/>
             </a:stretch>
           </a:blipFill>
         </p:spPr>
       </p:sp>
       <p:sp>
         <p:nvSpPr>
-          <p:cNvPr name="TextBox 3" id="3"/>
-          <p:cNvSpPr txBox="true"/>
+          <p:cNvPr id="3" name="TextBox 3"/>
+          <p:cNvSpPr txBox="1"/>
           <p:nvPr/>
         </p:nvSpPr>
         <p:spPr>
-          <a:xfrm rot="0">
+          <a:xfrm>
             <a:off x="1028700" y="8197050"/>
             <a:ext cx="15075940" cy="538794"/>
           </a:xfrm>
@@ -7191,7 +7217,7 @@
           </a:prstGeom>
         </p:spPr>
         <p:txBody>
-          <a:bodyPr anchor="t" rtlCol="false" tIns="0" lIns="0" bIns="0" rIns="0">
+          <a:bodyPr lIns="0" tIns="0" rIns="0" bIns="0" rtlCol="0" anchor="t">
             <a:spAutoFit/>
           </a:bodyPr>
           <a:lstStyle/>

</xml_diff>